<commit_message>
Port the app to the timeserie library
Made the change so that the app now uses the timeserie library.
Some change so that when choosing train mapping columns we can only see
columns that are logical or factors (columns that actually make sense)
</commit_message>
<xml_diff>
--- a/architecture/architecture.pptx
+++ b/architecture/architecture.pptx
@@ -5,10 +5,10 @@
     <p:sldMasterId id="2147483662" r:id="rId1"/>
   </p:sldMasterIdLst>
   <p:notesMasterIdLst>
-    <p:notesMasterId r:id="rId58"/>
+    <p:notesMasterId r:id="rId60"/>
   </p:notesMasterIdLst>
   <p:handoutMasterIdLst>
-    <p:handoutMasterId r:id="rId59"/>
+    <p:handoutMasterId r:id="rId61"/>
   </p:handoutMasterIdLst>
   <p:sldIdLst>
     <p:sldId id="294" r:id="rId2"/>
@@ -67,6 +67,8 @@
     <p:sldId id="352" r:id="rId55"/>
     <p:sldId id="353" r:id="rId56"/>
     <p:sldId id="354" r:id="rId57"/>
+    <p:sldId id="355" r:id="rId58"/>
+    <p:sldId id="356" r:id="rId59"/>
   </p:sldIdLst>
   <p:sldSz cx="9144000" cy="6858000" type="screen4x3"/>
   <p:notesSz cx="6797675" cy="9928225"/>
@@ -2671,8 +2673,8 @@
     <dgm:cxn modelId="{2A3F9581-524D-488D-8524-37AD624D800E}" type="presOf" srcId="{84861E17-6656-48BB-8D56-B55280026981}" destId="{66C3BEF1-1B14-4CBF-8343-D0FFEF7AB039}" srcOrd="0" destOrd="0" presId="urn:microsoft.com/office/officeart/2005/8/layout/process2"/>
     <dgm:cxn modelId="{CCC285B6-18F0-4230-835D-FA2827F56A56}" srcId="{F757BFC9-C911-46F8-B13C-8917DE4A0119}" destId="{F2A3FAB5-40FF-4109-A837-4895E28CC3F1}" srcOrd="3" destOrd="0" parTransId="{EEB9F0A0-A742-4F0B-B0CE-5F506DA1E83E}" sibTransId="{48521CB1-DEFB-4761-BA53-9B79EAAB7ED9}"/>
     <dgm:cxn modelId="{A40509C6-26D9-4736-9BC3-26A055EAF4A3}" type="presOf" srcId="{F2A3FAB5-40FF-4109-A837-4895E28CC3F1}" destId="{2E95BB91-2A8B-43CC-809A-2CB2FB107920}" srcOrd="0" destOrd="0" presId="urn:microsoft.com/office/officeart/2005/8/layout/process2"/>
+    <dgm:cxn modelId="{0FEB794E-59A1-4951-87A0-24A899195344}" type="presOf" srcId="{06AD1A66-FBF0-470D-975E-832605D15D9E}" destId="{B75F2C6E-90B3-441F-A823-018296AA52E8}" srcOrd="0" destOrd="0" presId="urn:microsoft.com/office/officeart/2005/8/layout/process2"/>
     <dgm:cxn modelId="{AAEA9A0C-98DD-4C8E-9A62-F857BEBEAE94}" type="presOf" srcId="{274F9FEB-DC56-4E5A-BE56-A3E442C6A2A2}" destId="{FCAC7CE0-7685-4F4D-8A23-224CA649F51D}" srcOrd="1" destOrd="0" presId="urn:microsoft.com/office/officeart/2005/8/layout/process2"/>
-    <dgm:cxn modelId="{0FEB794E-59A1-4951-87A0-24A899195344}" type="presOf" srcId="{06AD1A66-FBF0-470D-975E-832605D15D9E}" destId="{B75F2C6E-90B3-441F-A823-018296AA52E8}" srcOrd="0" destOrd="0" presId="urn:microsoft.com/office/officeart/2005/8/layout/process2"/>
     <dgm:cxn modelId="{D46C1C2D-7C2E-4B5F-B70F-35236BAF8D8A}" type="presOf" srcId="{F757BFC9-C911-46F8-B13C-8917DE4A0119}" destId="{85FBBA7D-4575-4231-9CB6-C3E3E3FC0E3E}" srcOrd="0" destOrd="0" presId="urn:microsoft.com/office/officeart/2005/8/layout/process2"/>
     <dgm:cxn modelId="{3D749046-D482-44A2-B795-47FD77E3FAFA}" srcId="{F757BFC9-C911-46F8-B13C-8917DE4A0119}" destId="{52F84908-B2DE-4046-9A34-FA89A3584236}" srcOrd="1" destOrd="0" parTransId="{65F158BB-49B6-408E-9698-9148775EF0BF}" sibTransId="{274F9FEB-DC56-4E5A-BE56-A3E442C6A2A2}"/>
     <dgm:cxn modelId="{0E4FBDC1-7D65-44C3-9038-4DAD5534A559}" type="presOf" srcId="{52F84908-B2DE-4046-9A34-FA89A3584236}" destId="{A422795E-4F7E-4C6A-B402-73E991020385}" srcOrd="0" destOrd="0" presId="urn:microsoft.com/office/officeart/2005/8/layout/process2"/>
@@ -5548,7 +5550,7 @@
           <a:p>
             <a:fld id="{F2D9E63A-3704-4D75-A1D0-26F9891BD504}" type="datetimeFigureOut">
               <a:rPr lang="en-US" smtClean="0"/>
-              <a:t>12/18/2016</a:t>
+              <a:t>12/20/2016</a:t>
             </a:fld>
             <a:endParaRPr lang="en-US"/>
           </a:p>
@@ -5713,7 +5715,7 @@
           <a:p>
             <a:fld id="{95364BAB-A6C6-45CC-A340-50E03A4190B2}" type="datetimeFigureOut">
               <a:rPr lang="en-US" smtClean="0"/>
-              <a:t>12/18/2016</a:t>
+              <a:t>12/20/2016</a:t>
             </a:fld>
             <a:endParaRPr lang="en-US"/>
           </a:p>
@@ -17106,6 +17108,266 @@
 </p:sld>
 </file>
 
+<file path=ppt/slides/slide57.xml><?xml version="1.0" encoding="utf-8"?>
+<p:sld xmlns:a="http://schemas.openxmlformats.org/drawingml/2006/main" xmlns:r="http://schemas.openxmlformats.org/officeDocument/2006/relationships" xmlns:p="http://schemas.openxmlformats.org/presentationml/2006/main">
+  <p:cSld>
+    <p:spTree>
+      <p:nvGrpSpPr>
+        <p:cNvPr id="1" name=""/>
+        <p:cNvGrpSpPr/>
+        <p:nvPr/>
+      </p:nvGrpSpPr>
+      <p:grpSpPr>
+        <a:xfrm>
+          <a:off x="0" y="0"/>
+          <a:ext cx="0" cy="0"/>
+          <a:chOff x="0" y="0"/>
+          <a:chExt cx="0" cy="0"/>
+        </a:xfrm>
+      </p:grpSpPr>
+      <p:sp>
+        <p:nvSpPr>
+          <p:cNvPr id="2" name="Title 1"/>
+          <p:cNvSpPr>
+            <a:spLocks noGrp="1"/>
+          </p:cNvSpPr>
+          <p:nvPr>
+            <p:ph type="title"/>
+          </p:nvPr>
+        </p:nvSpPr>
+        <p:spPr/>
+        <p:txBody>
+          <a:bodyPr/>
+          <a:lstStyle/>
+          <a:p>
+            <a:r>
+              <a:rPr lang="en-US" dirty="0" smtClean="0"/>
+              <a:t>Strategies for gap filling (running algorithm on missing data)</a:t>
+            </a:r>
+            <a:endParaRPr lang="en-US" dirty="0"/>
+          </a:p>
+        </p:txBody>
+      </p:sp>
+      <p:sp>
+        <p:nvSpPr>
+          <p:cNvPr id="3" name="Content Placeholder 2"/>
+          <p:cNvSpPr>
+            <a:spLocks noGrp="1"/>
+          </p:cNvSpPr>
+          <p:nvPr>
+            <p:ph idx="1"/>
+          </p:nvPr>
+        </p:nvSpPr>
+        <p:spPr/>
+        <p:txBody>
+          <a:bodyPr/>
+          <a:lstStyle/>
+          <a:p>
+            <a:r>
+              <a:rPr lang="en-US" dirty="0" smtClean="0"/>
+              <a:t>Different kind of gap filling</a:t>
+            </a:r>
+          </a:p>
+          <a:p>
+            <a:pPr lvl="1"/>
+            <a:r>
+              <a:rPr lang="en-US" dirty="0" smtClean="0"/>
+              <a:t>Weather variable</a:t>
+            </a:r>
+          </a:p>
+          <a:p>
+            <a:pPr lvl="1"/>
+            <a:r>
+              <a:rPr lang="en-US" dirty="0" smtClean="0"/>
+              <a:t>Load variable</a:t>
+            </a:r>
+          </a:p>
+          <a:p>
+            <a:pPr lvl="1"/>
+            <a:r>
+              <a:rPr lang="en-US" dirty="0" smtClean="0"/>
+              <a:t>Other..</a:t>
+            </a:r>
+          </a:p>
+          <a:p>
+            <a:r>
+              <a:rPr lang="en-US" dirty="0" smtClean="0"/>
+              <a:t>Gap filling before training</a:t>
+            </a:r>
+          </a:p>
+          <a:p>
+            <a:pPr lvl="1"/>
+            <a:r>
+              <a:rPr lang="en-US" dirty="0" smtClean="0"/>
+              <a:t>No need just train on whatever data is available</a:t>
+            </a:r>
+          </a:p>
+          <a:p>
+            <a:r>
+              <a:rPr lang="en-US" dirty="0" smtClean="0"/>
+              <a:t>Gap filling before predicting</a:t>
+            </a:r>
+          </a:p>
+          <a:p>
+            <a:pPr lvl="1"/>
+            <a:r>
+              <a:rPr lang="en-US" dirty="0" smtClean="0"/>
+              <a:t>Advantage: less gaps to fill</a:t>
+            </a:r>
+          </a:p>
+          <a:p>
+            <a:pPr lvl="1"/>
+            <a:r>
+              <a:rPr lang="en-US" dirty="0" smtClean="0"/>
+              <a:t>Inconvenient: more columns to fill (have to fill each input variable)</a:t>
+            </a:r>
+          </a:p>
+          <a:p>
+            <a:r>
+              <a:rPr lang="en-US" dirty="0" smtClean="0"/>
+              <a:t>Gap filling after predicting</a:t>
+            </a:r>
+          </a:p>
+          <a:p>
+            <a:pPr lvl="1"/>
+            <a:r>
+              <a:rPr lang="en-US" dirty="0" smtClean="0"/>
+              <a:t>Advantage: only one column to fill</a:t>
+            </a:r>
+          </a:p>
+          <a:p>
+            <a:pPr lvl="1"/>
+            <a:r>
+              <a:rPr lang="en-US" dirty="0" smtClean="0"/>
+              <a:t>Inconvenient: can be a lot of columns to fill, not very stable</a:t>
+            </a:r>
+            <a:endParaRPr lang="en-US" dirty="0"/>
+          </a:p>
+        </p:txBody>
+      </p:sp>
+    </p:spTree>
+    <p:extLst>
+      <p:ext uri="{BB962C8B-B14F-4D97-AF65-F5344CB8AC3E}">
+        <p14:creationId xmlns:p14="http://schemas.microsoft.com/office/powerpoint/2010/main" val="468185544"/>
+      </p:ext>
+    </p:extLst>
+  </p:cSld>
+  <p:clrMapOvr>
+    <a:masterClrMapping/>
+  </p:clrMapOvr>
+</p:sld>
+</file>
+
+<file path=ppt/slides/slide58.xml><?xml version="1.0" encoding="utf-8"?>
+<p:sld xmlns:a="http://schemas.openxmlformats.org/drawingml/2006/main" xmlns:r="http://schemas.openxmlformats.org/officeDocument/2006/relationships" xmlns:p="http://schemas.openxmlformats.org/presentationml/2006/main">
+  <p:cSld>
+    <p:spTree>
+      <p:nvGrpSpPr>
+        <p:cNvPr id="1" name=""/>
+        <p:cNvGrpSpPr/>
+        <p:nvPr/>
+      </p:nvGrpSpPr>
+      <p:grpSpPr>
+        <a:xfrm>
+          <a:off x="0" y="0"/>
+          <a:ext cx="0" cy="0"/>
+          <a:chOff x="0" y="0"/>
+          <a:chExt cx="0" cy="0"/>
+        </a:xfrm>
+      </p:grpSpPr>
+      <p:sp>
+        <p:nvSpPr>
+          <p:cNvPr id="2" name="Title 1"/>
+          <p:cNvSpPr>
+            <a:spLocks noGrp="1"/>
+          </p:cNvSpPr>
+          <p:nvPr>
+            <p:ph type="title"/>
+          </p:nvPr>
+        </p:nvSpPr>
+        <p:spPr/>
+        <p:txBody>
+          <a:bodyPr/>
+          <a:lstStyle/>
+          <a:p>
+            <a:r>
+              <a:rPr lang="en-US" dirty="0" smtClean="0"/>
+              <a:t>Gap filling strategies</a:t>
+            </a:r>
+            <a:endParaRPr lang="en-US" dirty="0"/>
+          </a:p>
+        </p:txBody>
+      </p:sp>
+      <p:sp>
+        <p:nvSpPr>
+          <p:cNvPr id="3" name="Content Placeholder 2"/>
+          <p:cNvSpPr>
+            <a:spLocks noGrp="1"/>
+          </p:cNvSpPr>
+          <p:nvPr>
+            <p:ph idx="1"/>
+          </p:nvPr>
+        </p:nvSpPr>
+        <p:spPr/>
+        <p:txBody>
+          <a:bodyPr/>
+          <a:lstStyle/>
+          <a:p>
+            <a:r>
+              <a:rPr lang="en-US" dirty="0" smtClean="0"/>
+              <a:t>We will gap fill before prediction because of</a:t>
+            </a:r>
+          </a:p>
+          <a:p>
+            <a:pPr lvl="1"/>
+            <a:r>
+              <a:rPr lang="en-US" dirty="0" smtClean="0"/>
+              <a:t>Robustness</a:t>
+            </a:r>
+          </a:p>
+          <a:p>
+            <a:pPr lvl="1"/>
+            <a:r>
+              <a:rPr lang="en-US" dirty="0" smtClean="0"/>
+              <a:t>Less rows to fill</a:t>
+            </a:r>
+          </a:p>
+          <a:p>
+            <a:r>
+              <a:rPr lang="en-US" dirty="0" smtClean="0"/>
+              <a:t>For load we’ll use a daily cluster model for prediction</a:t>
+            </a:r>
+          </a:p>
+          <a:p>
+            <a:r>
+              <a:rPr lang="en-US" dirty="0" smtClean="0"/>
+              <a:t>For weather we’ll use </a:t>
+            </a:r>
+            <a:r>
+              <a:rPr lang="en-US" smtClean="0"/>
+              <a:t>linear interpolation </a:t>
+            </a:r>
+            <a:r>
+              <a:rPr lang="en-US" dirty="0" smtClean="0"/>
+              <a:t>(for now)</a:t>
+            </a:r>
+            <a:endParaRPr lang="en-US" dirty="0"/>
+          </a:p>
+        </p:txBody>
+      </p:sp>
+    </p:spTree>
+    <p:extLst>
+      <p:ext uri="{BB962C8B-B14F-4D97-AF65-F5344CB8AC3E}">
+        <p14:creationId xmlns:p14="http://schemas.microsoft.com/office/powerpoint/2010/main" val="1753646044"/>
+      </p:ext>
+    </p:extLst>
+  </p:cSld>
+  <p:clrMapOvr>
+    <a:masterClrMapping/>
+  </p:clrMapOvr>
+</p:sld>
+</file>
+
 <file path=ppt/slides/slide6.xml><?xml version="1.0" encoding="utf-8"?>
 <p:sld xmlns:a="http://schemas.openxmlformats.org/drawingml/2006/main" xmlns:r="http://schemas.openxmlformats.org/officeDocument/2006/relationships" xmlns:p="http://schemas.openxmlformats.org/presentationml/2006/main">
   <p:cSld>

</xml_diff>

<commit_message>
More detailed algorithm metrics
Algorithm meta can now support a list of tables and a list of graphs for
algorithms that need to store and display more complex performance
metrics.
</commit_message>
<xml_diff>
--- a/architecture/architecture.pptx
+++ b/architecture/architecture.pptx
@@ -5,10 +5,10 @@
     <p:sldMasterId id="2147483662" r:id="rId1"/>
   </p:sldMasterIdLst>
   <p:notesMasterIdLst>
-    <p:notesMasterId r:id="rId60"/>
+    <p:notesMasterId r:id="rId74"/>
   </p:notesMasterIdLst>
   <p:handoutMasterIdLst>
-    <p:handoutMasterId r:id="rId61"/>
+    <p:handoutMasterId r:id="rId75"/>
   </p:handoutMasterIdLst>
   <p:sldIdLst>
     <p:sldId id="294" r:id="rId2"/>
@@ -69,6 +69,20 @@
     <p:sldId id="354" r:id="rId57"/>
     <p:sldId id="355" r:id="rId58"/>
     <p:sldId id="356" r:id="rId59"/>
+    <p:sldId id="357" r:id="rId60"/>
+    <p:sldId id="358" r:id="rId61"/>
+    <p:sldId id="359" r:id="rId62"/>
+    <p:sldId id="360" r:id="rId63"/>
+    <p:sldId id="362" r:id="rId64"/>
+    <p:sldId id="361" r:id="rId65"/>
+    <p:sldId id="363" r:id="rId66"/>
+    <p:sldId id="366" r:id="rId67"/>
+    <p:sldId id="367" r:id="rId68"/>
+    <p:sldId id="369" r:id="rId69"/>
+    <p:sldId id="368" r:id="rId70"/>
+    <p:sldId id="370" r:id="rId71"/>
+    <p:sldId id="371" r:id="rId72"/>
+    <p:sldId id="372" r:id="rId73"/>
   </p:sldIdLst>
   <p:sldSz cx="9144000" cy="6858000" type="screen4x3"/>
   <p:notesSz cx="6797675" cy="9928225"/>
@@ -17341,15 +17355,7 @@
           <a:p>
             <a:r>
               <a:rPr lang="en-US" dirty="0" smtClean="0"/>
-              <a:t>For weather we’ll use </a:t>
-            </a:r>
-            <a:r>
-              <a:rPr lang="en-US" smtClean="0"/>
-              <a:t>linear interpolation </a:t>
-            </a:r>
-            <a:r>
-              <a:rPr lang="en-US" dirty="0" smtClean="0"/>
-              <a:t>(for now)</a:t>
+              <a:t>For weather we’ll use linear interpolation (for now)</a:t>
             </a:r>
             <a:endParaRPr lang="en-US" dirty="0"/>
           </a:p>
@@ -17359,6 +17365,218 @@
     <p:extLst>
       <p:ext uri="{BB962C8B-B14F-4D97-AF65-F5344CB8AC3E}">
         <p14:creationId xmlns:p14="http://schemas.microsoft.com/office/powerpoint/2010/main" val="1753646044"/>
+      </p:ext>
+    </p:extLst>
+  </p:cSld>
+  <p:clrMapOvr>
+    <a:masterClrMapping/>
+  </p:clrMapOvr>
+</p:sld>
+</file>
+
+<file path=ppt/slides/slide59.xml><?xml version="1.0" encoding="utf-8"?>
+<p:sld xmlns:a="http://schemas.openxmlformats.org/drawingml/2006/main" xmlns:r="http://schemas.openxmlformats.org/officeDocument/2006/relationships" xmlns:p="http://schemas.openxmlformats.org/presentationml/2006/main">
+  <p:cSld>
+    <p:spTree>
+      <p:nvGrpSpPr>
+        <p:cNvPr id="1" name=""/>
+        <p:cNvGrpSpPr/>
+        <p:nvPr/>
+      </p:nvGrpSpPr>
+      <p:grpSpPr>
+        <a:xfrm>
+          <a:off x="0" y="0"/>
+          <a:ext cx="0" cy="0"/>
+          <a:chOff x="0" y="0"/>
+          <a:chExt cx="0" cy="0"/>
+        </a:xfrm>
+      </p:grpSpPr>
+      <p:sp>
+        <p:nvSpPr>
+          <p:cNvPr id="2" name="Title 1"/>
+          <p:cNvSpPr>
+            <a:spLocks noGrp="1"/>
+          </p:cNvSpPr>
+          <p:nvPr>
+            <p:ph type="title"/>
+          </p:nvPr>
+        </p:nvSpPr>
+        <p:spPr/>
+        <p:txBody>
+          <a:bodyPr/>
+          <a:lstStyle/>
+          <a:p>
+            <a:r>
+              <a:rPr lang="en-US" dirty="0" smtClean="0"/>
+              <a:t>TODO for Friday 23</a:t>
+            </a:r>
+            <a:r>
+              <a:rPr lang="en-US" baseline="30000" dirty="0" smtClean="0"/>
+              <a:t>rd</a:t>
+            </a:r>
+            <a:r>
+              <a:rPr lang="en-US" dirty="0" smtClean="0"/>
+              <a:t> (3 days)</a:t>
+            </a:r>
+            <a:endParaRPr lang="en-US" dirty="0"/>
+          </a:p>
+        </p:txBody>
+      </p:sp>
+      <p:sp>
+        <p:nvSpPr>
+          <p:cNvPr id="3" name="Content Placeholder 2"/>
+          <p:cNvSpPr>
+            <a:spLocks noGrp="1"/>
+          </p:cNvSpPr>
+          <p:nvPr>
+            <p:ph idx="1"/>
+          </p:nvPr>
+        </p:nvSpPr>
+        <p:spPr/>
+        <p:txBody>
+          <a:bodyPr/>
+          <a:lstStyle/>
+          <a:p>
+            <a:r>
+              <a:rPr lang="en-US" dirty="0" smtClean="0"/>
+              <a:t>Add grouping by days for Shuya </a:t>
+            </a:r>
+            <a:r>
+              <a:rPr lang="en-US" dirty="0" err="1" smtClean="0"/>
+              <a:t>svm</a:t>
+            </a:r>
+            <a:r>
+              <a:rPr lang="en-US" dirty="0" smtClean="0"/>
+              <a:t> -&gt; 1 hour</a:t>
+            </a:r>
+          </a:p>
+          <a:p>
+            <a:r>
+              <a:rPr lang="en-US" dirty="0"/>
+              <a:t>Add gap filling to Shuya </a:t>
+            </a:r>
+            <a:r>
+              <a:rPr lang="en-US" dirty="0" err="1"/>
+              <a:t>svm</a:t>
+            </a:r>
+            <a:r>
+              <a:rPr lang="en-US" dirty="0"/>
+              <a:t> so that it </a:t>
+            </a:r>
+            <a:r>
+              <a:rPr lang="en-US" dirty="0" smtClean="0"/>
+              <a:t>never </a:t>
+            </a:r>
+            <a:r>
+              <a:rPr lang="en-US" dirty="0"/>
+              <a:t>outputs </a:t>
+            </a:r>
+            <a:r>
+              <a:rPr lang="en-US" dirty="0" err="1" smtClean="0"/>
+              <a:t>Nas</a:t>
+            </a:r>
+            <a:r>
+              <a:rPr lang="en-US" dirty="0" smtClean="0"/>
+              <a:t> -&gt; 1 hour</a:t>
+            </a:r>
+          </a:p>
+          <a:p>
+            <a:r>
+              <a:rPr lang="en-US" dirty="0" smtClean="0"/>
+              <a:t>Modify the app so that it shows more information about the iterated algorithms performance -&gt; 2 hours</a:t>
+            </a:r>
+          </a:p>
+          <a:p>
+            <a:pPr lvl="1"/>
+            <a:r>
+              <a:rPr lang="en-US" dirty="0" smtClean="0"/>
+              <a:t>2 tables: one for time perf one for accuracy </a:t>
+            </a:r>
+            <a:r>
+              <a:rPr lang="en-US" dirty="0" err="1" smtClean="0"/>
+              <a:t>perfs</a:t>
+            </a:r>
+            <a:endParaRPr lang="en-US" dirty="0" smtClean="0"/>
+          </a:p>
+          <a:p>
+            <a:r>
+              <a:rPr lang="en-US" dirty="0" smtClean="0"/>
+              <a:t>Put 3-4 years of data from gefcom2017 into CSV format, send to Sasha -&gt; 2 hours</a:t>
+            </a:r>
+          </a:p>
+          <a:p>
+            <a:r>
+              <a:rPr lang="en-US" dirty="0" smtClean="0">
+                <a:solidFill>
+                  <a:srgbClr val="92D050"/>
+                </a:solidFill>
+              </a:rPr>
+              <a:t>Connect </a:t>
+            </a:r>
+            <a:r>
+              <a:rPr lang="en-US" dirty="0">
+                <a:solidFill>
+                  <a:srgbClr val="92D050"/>
+                </a:solidFill>
+              </a:rPr>
+              <a:t>and get data from the </a:t>
+            </a:r>
+            <a:r>
+              <a:rPr lang="en-US" dirty="0" smtClean="0">
+                <a:solidFill>
+                  <a:srgbClr val="92D050"/>
+                </a:solidFill>
+              </a:rPr>
+              <a:t>database -&gt; 3h</a:t>
+            </a:r>
+          </a:p>
+        </p:txBody>
+      </p:sp>
+      <p:pic>
+        <p:nvPicPr>
+          <p:cNvPr id="1026" name="Picture 2" descr="Image result for todo"/>
+          <p:cNvPicPr>
+            <a:picLocks noChangeAspect="1" noChangeArrowheads="1"/>
+          </p:cNvPicPr>
+          <p:nvPr/>
+        </p:nvPicPr>
+        <p:blipFill>
+          <a:blip r:embed="rId2" cstate="print">
+            <a:extLst>
+              <a:ext uri="{28A0092B-C50C-407E-A947-70E740481C1C}">
+                <a14:useLocalDpi xmlns:a14="http://schemas.microsoft.com/office/drawing/2010/main" val="0"/>
+              </a:ext>
+            </a:extLst>
+          </a:blip>
+          <a:srcRect/>
+          <a:stretch>
+            <a:fillRect/>
+          </a:stretch>
+        </p:blipFill>
+        <p:spPr bwMode="auto">
+          <a:xfrm>
+            <a:off x="7377545" y="118110"/>
+            <a:ext cx="1426730" cy="1426730"/>
+          </a:xfrm>
+          <a:prstGeom prst="rect">
+            <a:avLst/>
+          </a:prstGeom>
+          <a:noFill/>
+          <a:extLst>
+            <a:ext uri="{909E8E84-426E-40DD-AFC4-6F175D3DCCD1}">
+              <a14:hiddenFill xmlns:a14="http://schemas.microsoft.com/office/drawing/2010/main">
+                <a:solidFill>
+                  <a:srgbClr val="FFFFFF"/>
+                </a:solidFill>
+              </a14:hiddenFill>
+            </a:ext>
+          </a:extLst>
+        </p:spPr>
+      </p:pic>
+    </p:spTree>
+    <p:extLst>
+      <p:ext uri="{BB962C8B-B14F-4D97-AF65-F5344CB8AC3E}">
+        <p14:creationId xmlns:p14="http://schemas.microsoft.com/office/powerpoint/2010/main" val="3488114296"/>
       </p:ext>
     </p:extLst>
   </p:cSld>
@@ -17518,6 +17736,1825 @@
     <p:extLst>
       <p:ext uri="{BB962C8B-B14F-4D97-AF65-F5344CB8AC3E}">
         <p14:creationId xmlns:p14="http://schemas.microsoft.com/office/powerpoint/2010/main" val="885257109"/>
+      </p:ext>
+    </p:extLst>
+  </p:cSld>
+  <p:clrMapOvr>
+    <a:masterClrMapping/>
+  </p:clrMapOvr>
+</p:sld>
+</file>
+
+<file path=ppt/slides/slide60.xml><?xml version="1.0" encoding="utf-8"?>
+<p:sld xmlns:a="http://schemas.openxmlformats.org/drawingml/2006/main" xmlns:r="http://schemas.openxmlformats.org/officeDocument/2006/relationships" xmlns:p="http://schemas.openxmlformats.org/presentationml/2006/main">
+  <p:cSld>
+    <p:spTree>
+      <p:nvGrpSpPr>
+        <p:cNvPr id="1" name=""/>
+        <p:cNvGrpSpPr/>
+        <p:nvPr/>
+      </p:nvGrpSpPr>
+      <p:grpSpPr>
+        <a:xfrm>
+          <a:off x="0" y="0"/>
+          <a:ext cx="0" cy="0"/>
+          <a:chOff x="0" y="0"/>
+          <a:chExt cx="0" cy="0"/>
+        </a:xfrm>
+      </p:grpSpPr>
+      <p:sp>
+        <p:nvSpPr>
+          <p:cNvPr id="2" name="Title 1"/>
+          <p:cNvSpPr>
+            <a:spLocks noGrp="1"/>
+          </p:cNvSpPr>
+          <p:nvPr>
+            <p:ph type="title"/>
+          </p:nvPr>
+        </p:nvSpPr>
+        <p:spPr/>
+        <p:txBody>
+          <a:bodyPr/>
+          <a:lstStyle/>
+          <a:p>
+            <a:r>
+              <a:rPr lang="en-US" dirty="0" smtClean="0"/>
+              <a:t>TODO for December 31</a:t>
+            </a:r>
+            <a:r>
+              <a:rPr lang="en-US" baseline="30000" dirty="0" smtClean="0"/>
+              <a:t>st</a:t>
+            </a:r>
+            <a:r>
+              <a:rPr lang="en-US" dirty="0" smtClean="0"/>
+              <a:t> (11 days)</a:t>
+            </a:r>
+            <a:endParaRPr lang="en-US" dirty="0"/>
+          </a:p>
+        </p:txBody>
+      </p:sp>
+      <p:sp>
+        <p:nvSpPr>
+          <p:cNvPr id="3" name="Content Placeholder 2"/>
+          <p:cNvSpPr>
+            <a:spLocks noGrp="1"/>
+          </p:cNvSpPr>
+          <p:nvPr>
+            <p:ph idx="1"/>
+          </p:nvPr>
+        </p:nvSpPr>
+        <p:spPr/>
+        <p:txBody>
+          <a:bodyPr/>
+          <a:lstStyle/>
+          <a:p>
+            <a:pPr marL="0" indent="0">
+              <a:buNone/>
+            </a:pPr>
+            <a:r>
+              <a:rPr lang="en-US" dirty="0"/>
+              <a:t>Adapt the algorithms for the competition </a:t>
+            </a:r>
+            <a:r>
+              <a:rPr lang="en-US" dirty="0" smtClean="0"/>
+              <a:t>:</a:t>
+            </a:r>
+            <a:endParaRPr lang="en-US" dirty="0"/>
+          </a:p>
+          <a:p>
+            <a:r>
+              <a:rPr lang="en-US" dirty="0" smtClean="0"/>
+              <a:t>DST</a:t>
+            </a:r>
+          </a:p>
+          <a:p>
+            <a:pPr lvl="1"/>
+            <a:r>
+              <a:rPr lang="en-US" dirty="0" smtClean="0"/>
+              <a:t>Change the core </a:t>
+            </a:r>
+            <a:r>
+              <a:rPr lang="en-US" dirty="0" err="1" smtClean="0"/>
+              <a:t>tse</a:t>
+            </a:r>
+            <a:r>
+              <a:rPr lang="en-US" dirty="0" smtClean="0"/>
+              <a:t> class so that it can accommodate DST</a:t>
+            </a:r>
+          </a:p>
+          <a:p>
+            <a:pPr lvl="1"/>
+            <a:r>
+              <a:rPr lang="en-US" dirty="0" smtClean="0"/>
+              <a:t>Add a </a:t>
+            </a:r>
+            <a:r>
+              <a:rPr lang="en-US" dirty="0" err="1" smtClean="0"/>
+              <a:t>quickfix</a:t>
+            </a:r>
+            <a:endParaRPr lang="en-US" dirty="0" smtClean="0"/>
+          </a:p>
+          <a:p>
+            <a:r>
+              <a:rPr lang="en-US" dirty="0" smtClean="0"/>
+              <a:t>US </a:t>
+            </a:r>
+            <a:r>
+              <a:rPr lang="en-US" dirty="0"/>
+              <a:t>public </a:t>
+            </a:r>
+            <a:r>
+              <a:rPr lang="en-US" dirty="0" smtClean="0"/>
+              <a:t>holidays</a:t>
+            </a:r>
+            <a:endParaRPr lang="en-US" dirty="0"/>
+          </a:p>
+          <a:p>
+            <a:pPr lvl="1"/>
+            <a:r>
+              <a:rPr lang="en-US" dirty="0" smtClean="0"/>
+              <a:t>Write them in the same format as the SG holidays</a:t>
+            </a:r>
+          </a:p>
+          <a:p>
+            <a:pPr lvl="1"/>
+            <a:r>
+              <a:rPr lang="en-US" dirty="0" smtClean="0"/>
+              <a:t>Add a parameter so that a </a:t>
+            </a:r>
+            <a:r>
+              <a:rPr lang="en-US" dirty="0" err="1" smtClean="0"/>
+              <a:t>tse</a:t>
+            </a:r>
+            <a:r>
+              <a:rPr lang="en-US" dirty="0" smtClean="0"/>
+              <a:t> can be loaded according to different </a:t>
+            </a:r>
+            <a:r>
+              <a:rPr lang="en-US" dirty="0" err="1" smtClean="0"/>
+              <a:t>ph</a:t>
+            </a:r>
+            <a:r>
+              <a:rPr lang="en-US" dirty="0" smtClean="0"/>
+              <a:t> and </a:t>
+            </a:r>
+            <a:r>
+              <a:rPr lang="en-US" dirty="0" err="1" smtClean="0"/>
+              <a:t>timezone</a:t>
+            </a:r>
+            <a:endParaRPr lang="en-US" dirty="0" smtClean="0"/>
+          </a:p>
+          <a:p>
+            <a:r>
+              <a:rPr lang="en-US" dirty="0"/>
+              <a:t>long term forecasting</a:t>
+            </a:r>
+          </a:p>
+          <a:p>
+            <a:pPr lvl="1"/>
+            <a:r>
+              <a:rPr lang="en-US" dirty="0"/>
+              <a:t>Need a forecasting algorithm for weather variables</a:t>
+            </a:r>
+          </a:p>
+          <a:p>
+            <a:pPr lvl="1"/>
+            <a:r>
+              <a:rPr lang="en-US" dirty="0"/>
+              <a:t>Then use </a:t>
+            </a:r>
+            <a:r>
+              <a:rPr lang="en-US" dirty="0" err="1"/>
+              <a:t>Shuya’s</a:t>
+            </a:r>
+            <a:r>
+              <a:rPr lang="en-US" dirty="0"/>
+              <a:t> for the </a:t>
+            </a:r>
+            <a:r>
+              <a:rPr lang="en-US" dirty="0" smtClean="0"/>
+              <a:t>load</a:t>
+            </a:r>
+          </a:p>
+          <a:p>
+            <a:pPr lvl="1"/>
+            <a:r>
+              <a:rPr lang="en-US" dirty="0" smtClean="0"/>
+              <a:t>Create new method for pure iteration of a forecasting algorithm</a:t>
+            </a:r>
+          </a:p>
+        </p:txBody>
+      </p:sp>
+      <p:pic>
+        <p:nvPicPr>
+          <p:cNvPr id="4" name="Picture 2" descr="Image result for todo"/>
+          <p:cNvPicPr>
+            <a:picLocks noChangeAspect="1" noChangeArrowheads="1"/>
+          </p:cNvPicPr>
+          <p:nvPr/>
+        </p:nvPicPr>
+        <p:blipFill>
+          <a:blip r:embed="rId2" cstate="print">
+            <a:extLst>
+              <a:ext uri="{28A0092B-C50C-407E-A947-70E740481C1C}">
+                <a14:useLocalDpi xmlns:a14="http://schemas.microsoft.com/office/drawing/2010/main" val="0"/>
+              </a:ext>
+            </a:extLst>
+          </a:blip>
+          <a:srcRect/>
+          <a:stretch>
+            <a:fillRect/>
+          </a:stretch>
+        </p:blipFill>
+        <p:spPr bwMode="auto">
+          <a:xfrm>
+            <a:off x="7377545" y="118110"/>
+            <a:ext cx="1426730" cy="1426730"/>
+          </a:xfrm>
+          <a:prstGeom prst="rect">
+            <a:avLst/>
+          </a:prstGeom>
+          <a:noFill/>
+          <a:extLst>
+            <a:ext uri="{909E8E84-426E-40DD-AFC4-6F175D3DCCD1}">
+              <a14:hiddenFill xmlns:a14="http://schemas.microsoft.com/office/drawing/2010/main">
+                <a:solidFill>
+                  <a:srgbClr val="FFFFFF"/>
+                </a:solidFill>
+              </a14:hiddenFill>
+            </a:ext>
+          </a:extLst>
+        </p:spPr>
+      </p:pic>
+    </p:spTree>
+    <p:extLst>
+      <p:ext uri="{BB962C8B-B14F-4D97-AF65-F5344CB8AC3E}">
+        <p14:creationId xmlns:p14="http://schemas.microsoft.com/office/powerpoint/2010/main" val="421893155"/>
+      </p:ext>
+    </p:extLst>
+  </p:cSld>
+  <p:clrMapOvr>
+    <a:masterClrMapping/>
+  </p:clrMapOvr>
+</p:sld>
+</file>
+
+<file path=ppt/slides/slide61.xml><?xml version="1.0" encoding="utf-8"?>
+<p:sld xmlns:a="http://schemas.openxmlformats.org/drawingml/2006/main" xmlns:r="http://schemas.openxmlformats.org/officeDocument/2006/relationships" xmlns:p="http://schemas.openxmlformats.org/presentationml/2006/main">
+  <p:cSld>
+    <p:spTree>
+      <p:nvGrpSpPr>
+        <p:cNvPr id="1" name=""/>
+        <p:cNvGrpSpPr/>
+        <p:nvPr/>
+      </p:nvGrpSpPr>
+      <p:grpSpPr>
+        <a:xfrm>
+          <a:off x="0" y="0"/>
+          <a:ext cx="0" cy="0"/>
+          <a:chOff x="0" y="0"/>
+          <a:chExt cx="0" cy="0"/>
+        </a:xfrm>
+      </p:grpSpPr>
+      <p:sp>
+        <p:nvSpPr>
+          <p:cNvPr id="2" name="Title 1"/>
+          <p:cNvSpPr>
+            <a:spLocks noGrp="1"/>
+          </p:cNvSpPr>
+          <p:nvPr>
+            <p:ph type="title"/>
+          </p:nvPr>
+        </p:nvSpPr>
+        <p:spPr/>
+        <p:txBody>
+          <a:bodyPr/>
+          <a:lstStyle/>
+          <a:p>
+            <a:r>
+              <a:rPr lang="en-US" dirty="0"/>
+              <a:t>TODO for December 31</a:t>
+            </a:r>
+            <a:r>
+              <a:rPr lang="en-US" baseline="30000" dirty="0"/>
+              <a:t>st</a:t>
+            </a:r>
+            <a:r>
+              <a:rPr lang="en-US" dirty="0"/>
+              <a:t> (11 days</a:t>
+            </a:r>
+            <a:r>
+              <a:rPr lang="en-US" dirty="0" smtClean="0"/>
+              <a:t>): cont’d</a:t>
+            </a:r>
+            <a:endParaRPr lang="en-US" dirty="0"/>
+          </a:p>
+        </p:txBody>
+      </p:sp>
+      <p:sp>
+        <p:nvSpPr>
+          <p:cNvPr id="3" name="Content Placeholder 2"/>
+          <p:cNvSpPr>
+            <a:spLocks noGrp="1"/>
+          </p:cNvSpPr>
+          <p:nvPr>
+            <p:ph idx="1"/>
+          </p:nvPr>
+        </p:nvSpPr>
+        <p:spPr/>
+        <p:txBody>
+          <a:bodyPr/>
+          <a:lstStyle/>
+          <a:p>
+            <a:r>
+              <a:rPr lang="en-US" dirty="0"/>
+              <a:t>confidence interval</a:t>
+            </a:r>
+          </a:p>
+          <a:p>
+            <a:pPr lvl="1"/>
+            <a:r>
+              <a:rPr lang="en-US" dirty="0"/>
+              <a:t>After the algorithm is </a:t>
+            </a:r>
+            <a:r>
+              <a:rPr lang="en-US" dirty="0" smtClean="0"/>
+              <a:t>created</a:t>
+            </a:r>
+          </a:p>
+          <a:p>
+            <a:pPr lvl="1"/>
+            <a:r>
+              <a:rPr lang="en-US" dirty="0" smtClean="0"/>
+              <a:t>Compute the 10 quantiles of the residuals (on test data)</a:t>
+            </a:r>
+          </a:p>
+          <a:p>
+            <a:pPr lvl="1"/>
+            <a:r>
+              <a:rPr lang="en-US" dirty="0" smtClean="0"/>
+              <a:t>Use them as additive windows for the predictions quantiles</a:t>
+            </a:r>
+          </a:p>
+          <a:p>
+            <a:pPr lvl="1"/>
+            <a:r>
+              <a:rPr lang="en-US" dirty="0" smtClean="0"/>
+              <a:t>If have time, do the same but for each hour of the day, so that there is more precision</a:t>
+            </a:r>
+            <a:endParaRPr lang="en-US" dirty="0"/>
+          </a:p>
+          <a:p>
+            <a:r>
+              <a:rPr lang="en-US" dirty="0"/>
+              <a:t>choice of parameters for best results </a:t>
+            </a:r>
+          </a:p>
+          <a:p>
+            <a:pPr lvl="1"/>
+            <a:r>
+              <a:rPr lang="en-US" dirty="0"/>
+              <a:t>Iteration of the algorithm</a:t>
+            </a:r>
+          </a:p>
+          <a:p>
+            <a:endParaRPr lang="en-US" dirty="0"/>
+          </a:p>
+        </p:txBody>
+      </p:sp>
+      <p:pic>
+        <p:nvPicPr>
+          <p:cNvPr id="4" name="Picture 2" descr="Image result for todo"/>
+          <p:cNvPicPr>
+            <a:picLocks noChangeAspect="1" noChangeArrowheads="1"/>
+          </p:cNvPicPr>
+          <p:nvPr/>
+        </p:nvPicPr>
+        <p:blipFill>
+          <a:blip r:embed="rId2" cstate="print">
+            <a:extLst>
+              <a:ext uri="{28A0092B-C50C-407E-A947-70E740481C1C}">
+                <a14:useLocalDpi xmlns:a14="http://schemas.microsoft.com/office/drawing/2010/main" val="0"/>
+              </a:ext>
+            </a:extLst>
+          </a:blip>
+          <a:srcRect/>
+          <a:stretch>
+            <a:fillRect/>
+          </a:stretch>
+        </p:blipFill>
+        <p:spPr bwMode="auto">
+          <a:xfrm>
+            <a:off x="7377545" y="118110"/>
+            <a:ext cx="1426730" cy="1426730"/>
+          </a:xfrm>
+          <a:prstGeom prst="rect">
+            <a:avLst/>
+          </a:prstGeom>
+          <a:noFill/>
+          <a:extLst>
+            <a:ext uri="{909E8E84-426E-40DD-AFC4-6F175D3DCCD1}">
+              <a14:hiddenFill xmlns:a14="http://schemas.microsoft.com/office/drawing/2010/main">
+                <a:solidFill>
+                  <a:srgbClr val="FFFFFF"/>
+                </a:solidFill>
+              </a14:hiddenFill>
+            </a:ext>
+          </a:extLst>
+        </p:spPr>
+      </p:pic>
+    </p:spTree>
+    <p:extLst>
+      <p:ext uri="{BB962C8B-B14F-4D97-AF65-F5344CB8AC3E}">
+        <p14:creationId xmlns:p14="http://schemas.microsoft.com/office/powerpoint/2010/main" val="1981527404"/>
+      </p:ext>
+    </p:extLst>
+  </p:cSld>
+  <p:clrMapOvr>
+    <a:masterClrMapping/>
+  </p:clrMapOvr>
+</p:sld>
+</file>
+
+<file path=ppt/slides/slide62.xml><?xml version="1.0" encoding="utf-8"?>
+<p:sld xmlns:a="http://schemas.openxmlformats.org/drawingml/2006/main" xmlns:r="http://schemas.openxmlformats.org/officeDocument/2006/relationships" xmlns:p="http://schemas.openxmlformats.org/presentationml/2006/main">
+  <p:cSld>
+    <p:spTree>
+      <p:nvGrpSpPr>
+        <p:cNvPr id="1" name=""/>
+        <p:cNvGrpSpPr/>
+        <p:nvPr/>
+      </p:nvGrpSpPr>
+      <p:grpSpPr>
+        <a:xfrm>
+          <a:off x="0" y="0"/>
+          <a:ext cx="0" cy="0"/>
+          <a:chOff x="0" y="0"/>
+          <a:chExt cx="0" cy="0"/>
+        </a:xfrm>
+      </p:grpSpPr>
+      <p:pic>
+        <p:nvPicPr>
+          <p:cNvPr id="2052" name="Picture 4" descr="Image result for validated"/>
+          <p:cNvPicPr>
+            <a:picLocks noChangeAspect="1" noChangeArrowheads="1"/>
+          </p:cNvPicPr>
+          <p:nvPr/>
+        </p:nvPicPr>
+        <p:blipFill>
+          <a:blip r:embed="rId2">
+            <a:extLst>
+              <a:ext uri="{28A0092B-C50C-407E-A947-70E740481C1C}">
+                <a14:useLocalDpi xmlns:a14="http://schemas.microsoft.com/office/drawing/2010/main" val="0"/>
+              </a:ext>
+            </a:extLst>
+          </a:blip>
+          <a:srcRect/>
+          <a:stretch>
+            <a:fillRect/>
+          </a:stretch>
+        </p:blipFill>
+        <p:spPr bwMode="auto">
+          <a:xfrm>
+            <a:off x="6608330" y="66274"/>
+            <a:ext cx="2286000" cy="1905000"/>
+          </a:xfrm>
+          <a:prstGeom prst="rect">
+            <a:avLst/>
+          </a:prstGeom>
+          <a:noFill/>
+          <a:extLst>
+            <a:ext uri="{909E8E84-426E-40DD-AFC4-6F175D3DCCD1}">
+              <a14:hiddenFill xmlns:a14="http://schemas.microsoft.com/office/drawing/2010/main">
+                <a:solidFill>
+                  <a:srgbClr val="FFFFFF"/>
+                </a:solidFill>
+              </a14:hiddenFill>
+            </a:ext>
+          </a:extLst>
+        </p:spPr>
+      </p:pic>
+      <p:sp>
+        <p:nvSpPr>
+          <p:cNvPr id="2" name="Title 1"/>
+          <p:cNvSpPr>
+            <a:spLocks noGrp="1"/>
+          </p:cNvSpPr>
+          <p:nvPr>
+            <p:ph type="title"/>
+          </p:nvPr>
+        </p:nvSpPr>
+        <p:spPr/>
+        <p:txBody>
+          <a:bodyPr/>
+          <a:lstStyle/>
+          <a:p>
+            <a:r>
+              <a:rPr lang="en-US" dirty="0" smtClean="0"/>
+              <a:t>Validation of algorithms</a:t>
+            </a:r>
+            <a:endParaRPr lang="en-US" dirty="0"/>
+          </a:p>
+        </p:txBody>
+      </p:sp>
+      <p:sp>
+        <p:nvSpPr>
+          <p:cNvPr id="3" name="Content Placeholder 2"/>
+          <p:cNvSpPr>
+            <a:spLocks noGrp="1"/>
+          </p:cNvSpPr>
+          <p:nvPr>
+            <p:ph idx="1"/>
+          </p:nvPr>
+        </p:nvSpPr>
+        <p:spPr/>
+        <p:txBody>
+          <a:bodyPr/>
+          <a:lstStyle/>
+          <a:p>
+            <a:r>
+              <a:rPr lang="en-US" dirty="0" smtClean="0"/>
+              <a:t>Different types of algorithms have different</a:t>
+            </a:r>
+            <a:br>
+              <a:rPr lang="en-US" dirty="0" smtClean="0"/>
+            </a:br>
+            <a:r>
+              <a:rPr lang="en-US" dirty="0" smtClean="0"/>
+              <a:t>validation strategies and outputs</a:t>
+            </a:r>
+          </a:p>
+          <a:p>
+            <a:pPr lvl="1"/>
+            <a:r>
+              <a:rPr lang="en-US" b="1" dirty="0" smtClean="0"/>
+              <a:t>Online algorithms </a:t>
+            </a:r>
+            <a:r>
+              <a:rPr lang="en-US" dirty="0" smtClean="0"/>
+              <a:t>do not have test and train sets</a:t>
+            </a:r>
+          </a:p>
+          <a:p>
+            <a:pPr lvl="2"/>
+            <a:r>
+              <a:rPr lang="en-US" dirty="0" smtClean="0"/>
+              <a:t>They do have different accuracy according to how far they predict</a:t>
+            </a:r>
+          </a:p>
+          <a:p>
+            <a:pPr lvl="1"/>
+            <a:r>
+              <a:rPr lang="en-US" b="1" dirty="0" smtClean="0"/>
+              <a:t>Non-forecasting algorithms </a:t>
+            </a:r>
+            <a:r>
+              <a:rPr lang="en-US" dirty="0" smtClean="0"/>
+              <a:t>always have the same accuracy no matter how far they predict? Or at least they cannot be iterated</a:t>
+            </a:r>
+          </a:p>
+          <a:p>
+            <a:pPr lvl="1"/>
+            <a:r>
+              <a:rPr lang="en-US" b="1" dirty="0" smtClean="0"/>
+              <a:t>Forecasting algorithms</a:t>
+            </a:r>
+            <a:r>
+              <a:rPr lang="en-US" dirty="0" smtClean="0"/>
+              <a:t> have different values for different forecasting step: 1step, … </a:t>
+            </a:r>
+            <a:r>
+              <a:rPr lang="en-US" dirty="0" err="1" smtClean="0"/>
+              <a:t>nstep</a:t>
+            </a:r>
+            <a:endParaRPr lang="en-US" dirty="0" smtClean="0"/>
+          </a:p>
+          <a:p>
+            <a:pPr lvl="1"/>
+            <a:r>
+              <a:rPr lang="en-US" b="1" dirty="0" smtClean="0"/>
+              <a:t>Gap filling</a:t>
+            </a:r>
+          </a:p>
+          <a:p>
+            <a:pPr lvl="2"/>
+            <a:r>
+              <a:rPr lang="en-US" dirty="0" smtClean="0"/>
+              <a:t>No test and train</a:t>
+            </a:r>
+          </a:p>
+          <a:p>
+            <a:pPr lvl="2"/>
+            <a:r>
+              <a:rPr lang="en-US" dirty="0" smtClean="0"/>
+              <a:t>Can be compared only on available values</a:t>
+            </a:r>
+          </a:p>
+          <a:p>
+            <a:pPr lvl="1"/>
+            <a:r>
+              <a:rPr lang="en-US" dirty="0" smtClean="0"/>
+              <a:t>Time-series </a:t>
+            </a:r>
+            <a:r>
+              <a:rPr lang="en-US" b="1" dirty="0" smtClean="0"/>
+              <a:t>component decomposition</a:t>
+            </a:r>
+          </a:p>
+          <a:p>
+            <a:pPr lvl="1"/>
+            <a:r>
+              <a:rPr lang="en-US" b="1" dirty="0" smtClean="0"/>
+              <a:t>Clustering</a:t>
+            </a:r>
+            <a:r>
+              <a:rPr lang="en-US" dirty="0" smtClean="0"/>
+              <a:t> algorithm</a:t>
+            </a:r>
+          </a:p>
+        </p:txBody>
+      </p:sp>
+    </p:spTree>
+    <p:extLst>
+      <p:ext uri="{BB962C8B-B14F-4D97-AF65-F5344CB8AC3E}">
+        <p14:creationId xmlns:p14="http://schemas.microsoft.com/office/powerpoint/2010/main" val="1393881304"/>
+      </p:ext>
+    </p:extLst>
+  </p:cSld>
+  <p:clrMapOvr>
+    <a:masterClrMapping/>
+  </p:clrMapOvr>
+</p:sld>
+</file>
+
+<file path=ppt/slides/slide63.xml><?xml version="1.0" encoding="utf-8"?>
+<p:sld xmlns:a="http://schemas.openxmlformats.org/drawingml/2006/main" xmlns:r="http://schemas.openxmlformats.org/officeDocument/2006/relationships" xmlns:p="http://schemas.openxmlformats.org/presentationml/2006/main">
+  <p:cSld>
+    <p:spTree>
+      <p:nvGrpSpPr>
+        <p:cNvPr id="1" name=""/>
+        <p:cNvGrpSpPr/>
+        <p:nvPr/>
+      </p:nvGrpSpPr>
+      <p:grpSpPr>
+        <a:xfrm>
+          <a:off x="0" y="0"/>
+          <a:ext cx="0" cy="0"/>
+          <a:chOff x="0" y="0"/>
+          <a:chExt cx="0" cy="0"/>
+        </a:xfrm>
+      </p:grpSpPr>
+      <p:pic>
+        <p:nvPicPr>
+          <p:cNvPr id="4" name="Picture 4" descr="Image result for validated"/>
+          <p:cNvPicPr>
+            <a:picLocks noChangeAspect="1" noChangeArrowheads="1"/>
+          </p:cNvPicPr>
+          <p:nvPr/>
+        </p:nvPicPr>
+        <p:blipFill>
+          <a:blip r:embed="rId2">
+            <a:extLst>
+              <a:ext uri="{28A0092B-C50C-407E-A947-70E740481C1C}">
+                <a14:useLocalDpi xmlns:a14="http://schemas.microsoft.com/office/drawing/2010/main" val="0"/>
+              </a:ext>
+            </a:extLst>
+          </a:blip>
+          <a:srcRect/>
+          <a:stretch>
+            <a:fillRect/>
+          </a:stretch>
+        </p:blipFill>
+        <p:spPr bwMode="auto">
+          <a:xfrm>
+            <a:off x="6608330" y="66274"/>
+            <a:ext cx="2286000" cy="1905000"/>
+          </a:xfrm>
+          <a:prstGeom prst="rect">
+            <a:avLst/>
+          </a:prstGeom>
+          <a:noFill/>
+          <a:extLst>
+            <a:ext uri="{909E8E84-426E-40DD-AFC4-6F175D3DCCD1}">
+              <a14:hiddenFill xmlns:a14="http://schemas.microsoft.com/office/drawing/2010/main">
+                <a:solidFill>
+                  <a:srgbClr val="FFFFFF"/>
+                </a:solidFill>
+              </a14:hiddenFill>
+            </a:ext>
+          </a:extLst>
+        </p:spPr>
+      </p:pic>
+      <p:sp>
+        <p:nvSpPr>
+          <p:cNvPr id="2" name="Title 1"/>
+          <p:cNvSpPr>
+            <a:spLocks noGrp="1"/>
+          </p:cNvSpPr>
+          <p:nvPr>
+            <p:ph type="title"/>
+          </p:nvPr>
+        </p:nvSpPr>
+        <p:spPr/>
+        <p:txBody>
+          <a:bodyPr/>
+          <a:lstStyle/>
+          <a:p>
+            <a:r>
+              <a:rPr lang="en-US" dirty="0"/>
+              <a:t>Validation of </a:t>
+            </a:r>
+            <a:r>
+              <a:rPr lang="en-US" dirty="0" smtClean="0"/>
+              <a:t>algorithms : list of algorithms</a:t>
+            </a:r>
+            <a:br>
+              <a:rPr lang="en-US" dirty="0" smtClean="0"/>
+            </a:br>
+            <a:r>
+              <a:rPr lang="en-US" dirty="0" smtClean="0"/>
+              <a:t>continued</a:t>
+            </a:r>
+            <a:endParaRPr lang="en-US" dirty="0"/>
+          </a:p>
+        </p:txBody>
+      </p:sp>
+      <p:sp>
+        <p:nvSpPr>
+          <p:cNvPr id="3" name="Content Placeholder 2"/>
+          <p:cNvSpPr>
+            <a:spLocks noGrp="1"/>
+          </p:cNvSpPr>
+          <p:nvPr>
+            <p:ph idx="1"/>
+          </p:nvPr>
+        </p:nvSpPr>
+        <p:spPr/>
+        <p:txBody>
+          <a:bodyPr/>
+          <a:lstStyle/>
+          <a:p>
+            <a:r>
+              <a:rPr lang="en-US" b="1" dirty="0" smtClean="0"/>
+              <a:t>Outliers</a:t>
+            </a:r>
+            <a:r>
+              <a:rPr lang="en-US" dirty="0" smtClean="0"/>
+              <a:t> detection</a:t>
+            </a:r>
+          </a:p>
+          <a:p>
+            <a:r>
+              <a:rPr lang="en-US" b="1" dirty="0" smtClean="0"/>
+              <a:t>Fault</a:t>
+            </a:r>
+            <a:r>
+              <a:rPr lang="en-US" dirty="0" smtClean="0"/>
+              <a:t> detection</a:t>
+            </a:r>
+            <a:endParaRPr lang="en-US" dirty="0"/>
+          </a:p>
+        </p:txBody>
+      </p:sp>
+    </p:spTree>
+    <p:extLst>
+      <p:ext uri="{BB962C8B-B14F-4D97-AF65-F5344CB8AC3E}">
+        <p14:creationId xmlns:p14="http://schemas.microsoft.com/office/powerpoint/2010/main" val="2726230405"/>
+      </p:ext>
+    </p:extLst>
+  </p:cSld>
+  <p:clrMapOvr>
+    <a:masterClrMapping/>
+  </p:clrMapOvr>
+</p:sld>
+</file>
+
+<file path=ppt/slides/slide64.xml><?xml version="1.0" encoding="utf-8"?>
+<p:sld xmlns:a="http://schemas.openxmlformats.org/drawingml/2006/main" xmlns:r="http://schemas.openxmlformats.org/officeDocument/2006/relationships" xmlns:p="http://schemas.openxmlformats.org/presentationml/2006/main">
+  <p:cSld>
+    <p:spTree>
+      <p:nvGrpSpPr>
+        <p:cNvPr id="1" name=""/>
+        <p:cNvGrpSpPr/>
+        <p:nvPr/>
+      </p:nvGrpSpPr>
+      <p:grpSpPr>
+        <a:xfrm>
+          <a:off x="0" y="0"/>
+          <a:ext cx="0" cy="0"/>
+          <a:chOff x="0" y="0"/>
+          <a:chExt cx="0" cy="0"/>
+        </a:xfrm>
+      </p:grpSpPr>
+      <p:sp>
+        <p:nvSpPr>
+          <p:cNvPr id="2" name="Title 1"/>
+          <p:cNvSpPr>
+            <a:spLocks noGrp="1"/>
+          </p:cNvSpPr>
+          <p:nvPr>
+            <p:ph type="title"/>
+          </p:nvPr>
+        </p:nvSpPr>
+        <p:spPr/>
+        <p:txBody>
+          <a:bodyPr/>
+          <a:lstStyle/>
+          <a:p>
+            <a:r>
+              <a:rPr lang="en-US" dirty="0" smtClean="0"/>
+              <a:t>Validation of algorithms</a:t>
+            </a:r>
+            <a:endParaRPr lang="en-US" dirty="0"/>
+          </a:p>
+        </p:txBody>
+      </p:sp>
+      <p:sp>
+        <p:nvSpPr>
+          <p:cNvPr id="3" name="Content Placeholder 2"/>
+          <p:cNvSpPr>
+            <a:spLocks noGrp="1"/>
+          </p:cNvSpPr>
+          <p:nvPr>
+            <p:ph idx="1"/>
+          </p:nvPr>
+        </p:nvSpPr>
+        <p:spPr/>
+        <p:txBody>
+          <a:bodyPr/>
+          <a:lstStyle/>
+          <a:p>
+            <a:r>
+              <a:rPr lang="en-US" dirty="0" smtClean="0"/>
+              <a:t>R interface</a:t>
+            </a:r>
+          </a:p>
+          <a:p>
+            <a:pPr lvl="1"/>
+            <a:r>
+              <a:rPr lang="en-US" dirty="0" smtClean="0"/>
+              <a:t>One summary function</a:t>
+            </a:r>
+          </a:p>
+          <a:p>
+            <a:pPr lvl="2"/>
+            <a:r>
+              <a:rPr lang="en-US" dirty="0" smtClean="0"/>
+              <a:t>What was the call, the parameters</a:t>
+            </a:r>
+          </a:p>
+          <a:p>
+            <a:pPr lvl="2"/>
+            <a:r>
+              <a:rPr lang="en-US" dirty="0" smtClean="0"/>
+              <a:t>Some information about the results</a:t>
+            </a:r>
+          </a:p>
+          <a:p>
+            <a:pPr lvl="2"/>
+            <a:r>
+              <a:rPr lang="en-US" dirty="0" smtClean="0"/>
+              <a:t>Other</a:t>
+            </a:r>
+          </a:p>
+          <a:p>
+            <a:pPr lvl="1"/>
+            <a:r>
+              <a:rPr lang="en-US" dirty="0" smtClean="0"/>
+              <a:t>Information about the speed</a:t>
+            </a:r>
+          </a:p>
+          <a:p>
+            <a:pPr lvl="1"/>
+            <a:r>
+              <a:rPr lang="en-US" dirty="0" smtClean="0"/>
+              <a:t>Information about the performance</a:t>
+            </a:r>
+          </a:p>
+          <a:p>
+            <a:r>
+              <a:rPr lang="en-US" dirty="0" smtClean="0"/>
+              <a:t>Shiny interface</a:t>
+            </a:r>
+          </a:p>
+          <a:p>
+            <a:pPr lvl="1"/>
+            <a:r>
+              <a:rPr lang="en-US" dirty="0" smtClean="0"/>
+              <a:t>One summary function</a:t>
+            </a:r>
+          </a:p>
+          <a:p>
+            <a:pPr lvl="1"/>
+            <a:r>
+              <a:rPr lang="en-US" dirty="0"/>
+              <a:t>4</a:t>
+            </a:r>
+            <a:r>
+              <a:rPr lang="en-US" dirty="0" smtClean="0"/>
+              <a:t> types of outputs</a:t>
+            </a:r>
+          </a:p>
+          <a:p>
+            <a:pPr lvl="2"/>
+            <a:r>
+              <a:rPr lang="en-US" dirty="0" smtClean="0"/>
+              <a:t>1 fixed UI</a:t>
+            </a:r>
+          </a:p>
+          <a:p>
+            <a:pPr lvl="2"/>
+            <a:r>
+              <a:rPr lang="en-US" dirty="0" smtClean="0"/>
+              <a:t>A (named) list of </a:t>
+            </a:r>
+            <a:r>
+              <a:rPr lang="en-US" dirty="0" err="1" smtClean="0"/>
+              <a:t>data.frame</a:t>
+            </a:r>
+            <a:endParaRPr lang="en-US" dirty="0" smtClean="0"/>
+          </a:p>
+          <a:p>
+            <a:pPr lvl="2"/>
+            <a:r>
+              <a:rPr lang="en-US" dirty="0" smtClean="0"/>
+              <a:t>A (named) list of ggplot2 objects</a:t>
+            </a:r>
+          </a:p>
+          <a:p>
+            <a:pPr lvl="2"/>
+            <a:endParaRPr lang="en-US" dirty="0" smtClean="0"/>
+          </a:p>
+          <a:p>
+            <a:pPr lvl="1"/>
+            <a:endParaRPr lang="en-US" dirty="0"/>
+          </a:p>
+        </p:txBody>
+      </p:sp>
+      <p:pic>
+        <p:nvPicPr>
+          <p:cNvPr id="4" name="Picture 4" descr="Image result for validated"/>
+          <p:cNvPicPr>
+            <a:picLocks noChangeAspect="1" noChangeArrowheads="1"/>
+          </p:cNvPicPr>
+          <p:nvPr/>
+        </p:nvPicPr>
+        <p:blipFill>
+          <a:blip r:embed="rId2">
+            <a:extLst>
+              <a:ext uri="{28A0092B-C50C-407E-A947-70E740481C1C}">
+                <a14:useLocalDpi xmlns:a14="http://schemas.microsoft.com/office/drawing/2010/main" val="0"/>
+              </a:ext>
+            </a:extLst>
+          </a:blip>
+          <a:srcRect/>
+          <a:stretch>
+            <a:fillRect/>
+          </a:stretch>
+        </p:blipFill>
+        <p:spPr bwMode="auto">
+          <a:xfrm>
+            <a:off x="6608330" y="66274"/>
+            <a:ext cx="2286000" cy="1905000"/>
+          </a:xfrm>
+          <a:prstGeom prst="rect">
+            <a:avLst/>
+          </a:prstGeom>
+          <a:noFill/>
+          <a:extLst>
+            <a:ext uri="{909E8E84-426E-40DD-AFC4-6F175D3DCCD1}">
+              <a14:hiddenFill xmlns:a14="http://schemas.microsoft.com/office/drawing/2010/main">
+                <a:solidFill>
+                  <a:srgbClr val="FFFFFF"/>
+                </a:solidFill>
+              </a14:hiddenFill>
+            </a:ext>
+          </a:extLst>
+        </p:spPr>
+      </p:pic>
+    </p:spTree>
+    <p:extLst>
+      <p:ext uri="{BB962C8B-B14F-4D97-AF65-F5344CB8AC3E}">
+        <p14:creationId xmlns:p14="http://schemas.microsoft.com/office/powerpoint/2010/main" val="716721163"/>
+      </p:ext>
+    </p:extLst>
+  </p:cSld>
+  <p:clrMapOvr>
+    <a:masterClrMapping/>
+  </p:clrMapOvr>
+</p:sld>
+</file>
+
+<file path=ppt/slides/slide65.xml><?xml version="1.0" encoding="utf-8"?>
+<p:sld xmlns:a="http://schemas.openxmlformats.org/drawingml/2006/main" xmlns:r="http://schemas.openxmlformats.org/officeDocument/2006/relationships" xmlns:p="http://schemas.openxmlformats.org/presentationml/2006/main">
+  <p:cSld>
+    <p:spTree>
+      <p:nvGrpSpPr>
+        <p:cNvPr id="1" name=""/>
+        <p:cNvGrpSpPr/>
+        <p:nvPr/>
+      </p:nvGrpSpPr>
+      <p:grpSpPr>
+        <a:xfrm>
+          <a:off x="0" y="0"/>
+          <a:ext cx="0" cy="0"/>
+          <a:chOff x="0" y="0"/>
+          <a:chExt cx="0" cy="0"/>
+        </a:xfrm>
+      </p:grpSpPr>
+      <p:sp>
+        <p:nvSpPr>
+          <p:cNvPr id="2" name="Title 1"/>
+          <p:cNvSpPr>
+            <a:spLocks noGrp="1"/>
+          </p:cNvSpPr>
+          <p:nvPr>
+            <p:ph type="title"/>
+          </p:nvPr>
+        </p:nvSpPr>
+        <p:spPr/>
+        <p:txBody>
+          <a:bodyPr/>
+          <a:lstStyle/>
+          <a:p>
+            <a:r>
+              <a:rPr lang="en-US" dirty="0" smtClean="0"/>
+              <a:t>Prediction</a:t>
+            </a:r>
+            <a:endParaRPr lang="en-US" dirty="0"/>
+          </a:p>
+        </p:txBody>
+      </p:sp>
+      <p:sp>
+        <p:nvSpPr>
+          <p:cNvPr id="3" name="Content Placeholder 2"/>
+          <p:cNvSpPr>
+            <a:spLocks noGrp="1"/>
+          </p:cNvSpPr>
+          <p:nvPr>
+            <p:ph idx="1"/>
+          </p:nvPr>
+        </p:nvSpPr>
+        <p:spPr/>
+        <p:txBody>
+          <a:bodyPr/>
+          <a:lstStyle/>
+          <a:p>
+            <a:r>
+              <a:rPr lang="en-US" dirty="0" smtClean="0"/>
+              <a:t>Input</a:t>
+            </a:r>
+          </a:p>
+          <a:p>
+            <a:pPr lvl="1"/>
+            <a:r>
+              <a:rPr lang="en-US" dirty="0" smtClean="0"/>
+              <a:t>TSE object with missing values -&gt; use diagonal</a:t>
+            </a:r>
+            <a:endParaRPr lang="en-US" dirty="0"/>
+          </a:p>
+        </p:txBody>
+      </p:sp>
+    </p:spTree>
+    <p:extLst>
+      <p:ext uri="{BB962C8B-B14F-4D97-AF65-F5344CB8AC3E}">
+        <p14:creationId xmlns:p14="http://schemas.microsoft.com/office/powerpoint/2010/main" val="3897364995"/>
+      </p:ext>
+    </p:extLst>
+  </p:cSld>
+  <p:clrMapOvr>
+    <a:masterClrMapping/>
+  </p:clrMapOvr>
+</p:sld>
+</file>
+
+<file path=ppt/slides/slide66.xml><?xml version="1.0" encoding="utf-8"?>
+<p:sld xmlns:a="http://schemas.openxmlformats.org/drawingml/2006/main" xmlns:r="http://schemas.openxmlformats.org/officeDocument/2006/relationships" xmlns:p="http://schemas.openxmlformats.org/presentationml/2006/main">
+  <p:cSld>
+    <p:spTree>
+      <p:nvGrpSpPr>
+        <p:cNvPr id="1" name=""/>
+        <p:cNvGrpSpPr/>
+        <p:nvPr/>
+      </p:nvGrpSpPr>
+      <p:grpSpPr>
+        <a:xfrm>
+          <a:off x="0" y="0"/>
+          <a:ext cx="0" cy="0"/>
+          <a:chOff x="0" y="0"/>
+          <a:chExt cx="0" cy="0"/>
+        </a:xfrm>
+      </p:grpSpPr>
+      <p:pic>
+        <p:nvPicPr>
+          <p:cNvPr id="5122" name="Picture 2" descr="Image result for time series"/>
+          <p:cNvPicPr>
+            <a:picLocks noChangeAspect="1" noChangeArrowheads="1"/>
+          </p:cNvPicPr>
+          <p:nvPr/>
+        </p:nvPicPr>
+        <p:blipFill>
+          <a:blip r:embed="rId2">
+            <a:extLst>
+              <a:ext uri="{28A0092B-C50C-407E-A947-70E740481C1C}">
+                <a14:useLocalDpi xmlns:a14="http://schemas.microsoft.com/office/drawing/2010/main" val="0"/>
+              </a:ext>
+            </a:extLst>
+          </a:blip>
+          <a:srcRect/>
+          <a:stretch>
+            <a:fillRect/>
+          </a:stretch>
+        </p:blipFill>
+        <p:spPr bwMode="auto">
+          <a:xfrm>
+            <a:off x="6335800" y="14364"/>
+            <a:ext cx="2558819" cy="1467652"/>
+          </a:xfrm>
+          <a:prstGeom prst="rect">
+            <a:avLst/>
+          </a:prstGeom>
+          <a:noFill/>
+          <a:extLst>
+            <a:ext uri="{909E8E84-426E-40DD-AFC4-6F175D3DCCD1}">
+              <a14:hiddenFill xmlns:a14="http://schemas.microsoft.com/office/drawing/2010/main">
+                <a:solidFill>
+                  <a:srgbClr val="FFFFFF"/>
+                </a:solidFill>
+              </a14:hiddenFill>
+            </a:ext>
+          </a:extLst>
+        </p:spPr>
+      </p:pic>
+      <p:sp>
+        <p:nvSpPr>
+          <p:cNvPr id="2" name="Title 1"/>
+          <p:cNvSpPr>
+            <a:spLocks noGrp="1"/>
+          </p:cNvSpPr>
+          <p:nvPr>
+            <p:ph type="title"/>
+          </p:nvPr>
+        </p:nvSpPr>
+        <p:spPr/>
+        <p:txBody>
+          <a:bodyPr/>
+          <a:lstStyle/>
+          <a:p>
+            <a:r>
+              <a:rPr lang="en-US" dirty="0" err="1" smtClean="0"/>
+              <a:t>Tse</a:t>
+            </a:r>
+            <a:r>
+              <a:rPr lang="en-US" dirty="0" smtClean="0"/>
+              <a:t> base class</a:t>
+            </a:r>
+            <a:endParaRPr lang="en-US" dirty="0"/>
+          </a:p>
+        </p:txBody>
+      </p:sp>
+      <p:sp>
+        <p:nvSpPr>
+          <p:cNvPr id="3" name="Content Placeholder 2"/>
+          <p:cNvSpPr>
+            <a:spLocks noGrp="1"/>
+          </p:cNvSpPr>
+          <p:nvPr>
+            <p:ph idx="1"/>
+          </p:nvPr>
+        </p:nvSpPr>
+        <p:spPr/>
+        <p:txBody>
+          <a:bodyPr/>
+          <a:lstStyle/>
+          <a:p>
+            <a:r>
+              <a:rPr lang="en-US" dirty="0" err="1" smtClean="0"/>
+              <a:t>Todo</a:t>
+            </a:r>
+            <a:r>
+              <a:rPr lang="en-US" dirty="0" smtClean="0"/>
+              <a:t>:</a:t>
+            </a:r>
+          </a:p>
+          <a:p>
+            <a:pPr lvl="1"/>
+            <a:r>
+              <a:rPr lang="en-US" dirty="0" smtClean="0"/>
+              <a:t>Remove </a:t>
+            </a:r>
+            <a:r>
+              <a:rPr lang="en-US" dirty="0" err="1" smtClean="0"/>
+              <a:t>data.frame</a:t>
+            </a:r>
+            <a:r>
+              <a:rPr lang="en-US" dirty="0" smtClean="0"/>
+              <a:t> attribute</a:t>
+            </a:r>
+          </a:p>
+          <a:p>
+            <a:pPr lvl="1"/>
+            <a:r>
+              <a:rPr lang="en-US" dirty="0" smtClean="0"/>
+              <a:t>Define missing indexing and assignment functions</a:t>
+            </a:r>
+          </a:p>
+          <a:p>
+            <a:pPr lvl="1"/>
+            <a:r>
+              <a:rPr lang="en-US" dirty="0" smtClean="0"/>
+              <a:t>Add tests of all functions: especially the indexation and assignment ones.</a:t>
+            </a:r>
+          </a:p>
+          <a:p>
+            <a:pPr lvl="1"/>
+            <a:r>
+              <a:rPr lang="en-US" dirty="0" smtClean="0"/>
+              <a:t>Find a coherent indexation scheme</a:t>
+            </a:r>
+            <a:endParaRPr lang="en-US" dirty="0"/>
+          </a:p>
+        </p:txBody>
+      </p:sp>
+    </p:spTree>
+    <p:extLst>
+      <p:ext uri="{BB962C8B-B14F-4D97-AF65-F5344CB8AC3E}">
+        <p14:creationId xmlns:p14="http://schemas.microsoft.com/office/powerpoint/2010/main" val="2005280631"/>
+      </p:ext>
+    </p:extLst>
+  </p:cSld>
+  <p:clrMapOvr>
+    <a:masterClrMapping/>
+  </p:clrMapOvr>
+</p:sld>
+</file>
+
+<file path=ppt/slides/slide67.xml><?xml version="1.0" encoding="utf-8"?>
+<p:sld xmlns:a="http://schemas.openxmlformats.org/drawingml/2006/main" xmlns:r="http://schemas.openxmlformats.org/officeDocument/2006/relationships" xmlns:p="http://schemas.openxmlformats.org/presentationml/2006/main">
+  <p:cSld>
+    <p:spTree>
+      <p:nvGrpSpPr>
+        <p:cNvPr id="1" name=""/>
+        <p:cNvGrpSpPr/>
+        <p:nvPr/>
+      </p:nvGrpSpPr>
+      <p:grpSpPr>
+        <a:xfrm>
+          <a:off x="0" y="0"/>
+          <a:ext cx="0" cy="0"/>
+          <a:chOff x="0" y="0"/>
+          <a:chExt cx="0" cy="0"/>
+        </a:xfrm>
+      </p:grpSpPr>
+      <p:pic>
+        <p:nvPicPr>
+          <p:cNvPr id="5122" name="Picture 2" descr="Image result for time series"/>
+          <p:cNvPicPr>
+            <a:picLocks noChangeAspect="1" noChangeArrowheads="1"/>
+          </p:cNvPicPr>
+          <p:nvPr/>
+        </p:nvPicPr>
+        <p:blipFill>
+          <a:blip r:embed="rId2">
+            <a:extLst>
+              <a:ext uri="{28A0092B-C50C-407E-A947-70E740481C1C}">
+                <a14:useLocalDpi xmlns:a14="http://schemas.microsoft.com/office/drawing/2010/main" val="0"/>
+              </a:ext>
+            </a:extLst>
+          </a:blip>
+          <a:srcRect/>
+          <a:stretch>
+            <a:fillRect/>
+          </a:stretch>
+        </p:blipFill>
+        <p:spPr bwMode="auto">
+          <a:xfrm>
+            <a:off x="6335800" y="14364"/>
+            <a:ext cx="2558819" cy="1467652"/>
+          </a:xfrm>
+          <a:prstGeom prst="rect">
+            <a:avLst/>
+          </a:prstGeom>
+          <a:noFill/>
+          <a:extLst>
+            <a:ext uri="{909E8E84-426E-40DD-AFC4-6F175D3DCCD1}">
+              <a14:hiddenFill xmlns:a14="http://schemas.microsoft.com/office/drawing/2010/main">
+                <a:solidFill>
+                  <a:srgbClr val="FFFFFF"/>
+                </a:solidFill>
+              </a14:hiddenFill>
+            </a:ext>
+          </a:extLst>
+        </p:spPr>
+      </p:pic>
+      <p:sp>
+        <p:nvSpPr>
+          <p:cNvPr id="2" name="Title 1"/>
+          <p:cNvSpPr>
+            <a:spLocks noGrp="1"/>
+          </p:cNvSpPr>
+          <p:nvPr>
+            <p:ph type="title"/>
+          </p:nvPr>
+        </p:nvSpPr>
+        <p:spPr/>
+        <p:txBody>
+          <a:bodyPr/>
+          <a:lstStyle/>
+          <a:p>
+            <a:r>
+              <a:rPr lang="en-US" dirty="0" smtClean="0"/>
+              <a:t>Indexation of time series</a:t>
+            </a:r>
+            <a:endParaRPr lang="en-US" dirty="0"/>
+          </a:p>
+        </p:txBody>
+      </p:sp>
+      <p:sp>
+        <p:nvSpPr>
+          <p:cNvPr id="3" name="Content Placeholder 2"/>
+          <p:cNvSpPr>
+            <a:spLocks noGrp="1"/>
+          </p:cNvSpPr>
+          <p:nvPr>
+            <p:ph idx="1"/>
+          </p:nvPr>
+        </p:nvSpPr>
+        <p:spPr/>
+        <p:txBody>
+          <a:bodyPr/>
+          <a:lstStyle/>
+          <a:p>
+            <a:r>
+              <a:rPr lang="en-US" dirty="0" smtClean="0"/>
+              <a:t>Constraints</a:t>
+            </a:r>
+          </a:p>
+          <a:p>
+            <a:pPr lvl="1"/>
+            <a:r>
+              <a:rPr lang="en-US" dirty="0" smtClean="0"/>
+              <a:t>Must be able to handle DST??</a:t>
+            </a:r>
+          </a:p>
+          <a:p>
+            <a:pPr lvl="1"/>
+            <a:r>
+              <a:rPr lang="en-US" dirty="0" smtClean="0"/>
+              <a:t>Multi-key time index -&gt; sometimes want to index by timestamp = 1 key index, sometimes want to index by day plus </a:t>
+            </a:r>
+            <a:r>
+              <a:rPr lang="en-US" dirty="0" err="1" smtClean="0"/>
+              <a:t>period_in_day</a:t>
+            </a:r>
+            <a:r>
+              <a:rPr lang="en-US" dirty="0" smtClean="0"/>
+              <a:t> = 2 keys index, in the future 3 keys index?</a:t>
+            </a:r>
+          </a:p>
+          <a:p>
+            <a:pPr lvl="1"/>
+            <a:r>
+              <a:rPr lang="en-US" dirty="0" smtClean="0"/>
+              <a:t>Handling of different time intervals</a:t>
+            </a:r>
+          </a:p>
+          <a:p>
+            <a:pPr lvl="1"/>
+            <a:r>
+              <a:rPr lang="en-US" dirty="0" smtClean="0"/>
+              <a:t>Handling of different time decorations</a:t>
+            </a:r>
+          </a:p>
+          <a:p>
+            <a:r>
+              <a:rPr lang="en-US" dirty="0" smtClean="0"/>
+              <a:t>Solution</a:t>
+            </a:r>
+          </a:p>
+          <a:p>
+            <a:pPr lvl="1"/>
+            <a:r>
+              <a:rPr lang="en-US" dirty="0" smtClean="0"/>
+              <a:t>One double time-index (=</a:t>
+            </a:r>
+            <a:r>
+              <a:rPr lang="en-US" dirty="0" err="1" smtClean="0"/>
+              <a:t>POSIXct</a:t>
+            </a:r>
+            <a:r>
+              <a:rPr lang="en-US" dirty="0" smtClean="0"/>
+              <a:t>) all the other columns are considered value columns -&gt; becomes very similar to </a:t>
+            </a:r>
+            <a:r>
+              <a:rPr lang="en-US" dirty="0" err="1" smtClean="0"/>
+              <a:t>ts</a:t>
+            </a:r>
+            <a:r>
+              <a:rPr lang="en-US" dirty="0" smtClean="0"/>
+              <a:t> and </a:t>
+            </a:r>
+            <a:r>
+              <a:rPr lang="en-US" dirty="0" err="1" smtClean="0"/>
+              <a:t>mts</a:t>
+            </a:r>
+            <a:r>
+              <a:rPr lang="en-US" dirty="0" smtClean="0"/>
+              <a:t> class -&gt; is it possible to merge them?</a:t>
+            </a:r>
+          </a:p>
+          <a:p>
+            <a:pPr lvl="1"/>
+            <a:r>
+              <a:rPr lang="en-US" dirty="0" smtClean="0"/>
+              <a:t>For multi-index of time. </a:t>
+            </a:r>
+          </a:p>
+          <a:p>
+            <a:pPr lvl="1"/>
+            <a:endParaRPr lang="en-US" dirty="0"/>
+          </a:p>
+        </p:txBody>
+      </p:sp>
+    </p:spTree>
+    <p:extLst>
+      <p:ext uri="{BB962C8B-B14F-4D97-AF65-F5344CB8AC3E}">
+        <p14:creationId xmlns:p14="http://schemas.microsoft.com/office/powerpoint/2010/main" val="2269445445"/>
+      </p:ext>
+    </p:extLst>
+  </p:cSld>
+  <p:clrMapOvr>
+    <a:masterClrMapping/>
+  </p:clrMapOvr>
+</p:sld>
+</file>
+
+<file path=ppt/slides/slide68.xml><?xml version="1.0" encoding="utf-8"?>
+<p:sld xmlns:a="http://schemas.openxmlformats.org/drawingml/2006/main" xmlns:r="http://schemas.openxmlformats.org/officeDocument/2006/relationships" xmlns:p="http://schemas.openxmlformats.org/presentationml/2006/main">
+  <p:cSld>
+    <p:spTree>
+      <p:nvGrpSpPr>
+        <p:cNvPr id="1" name=""/>
+        <p:cNvGrpSpPr/>
+        <p:nvPr/>
+      </p:nvGrpSpPr>
+      <p:grpSpPr>
+        <a:xfrm>
+          <a:off x="0" y="0"/>
+          <a:ext cx="0" cy="0"/>
+          <a:chOff x="0" y="0"/>
+          <a:chExt cx="0" cy="0"/>
+        </a:xfrm>
+      </p:grpSpPr>
+      <p:sp>
+        <p:nvSpPr>
+          <p:cNvPr id="2" name="Title 1"/>
+          <p:cNvSpPr>
+            <a:spLocks noGrp="1"/>
+          </p:cNvSpPr>
+          <p:nvPr>
+            <p:ph type="title"/>
+          </p:nvPr>
+        </p:nvSpPr>
+        <p:spPr/>
+        <p:txBody>
+          <a:bodyPr/>
+          <a:lstStyle/>
+          <a:p>
+            <a:r>
+              <a:rPr lang="en-US" dirty="0" smtClean="0"/>
+              <a:t>Availability information in time-series</a:t>
+            </a:r>
+            <a:endParaRPr lang="en-US" dirty="0"/>
+          </a:p>
+        </p:txBody>
+      </p:sp>
+      <p:sp>
+        <p:nvSpPr>
+          <p:cNvPr id="3" name="Content Placeholder 2"/>
+          <p:cNvSpPr>
+            <a:spLocks noGrp="1"/>
+          </p:cNvSpPr>
+          <p:nvPr>
+            <p:ph idx="1"/>
+          </p:nvPr>
+        </p:nvSpPr>
+        <p:spPr/>
+        <p:txBody>
+          <a:bodyPr/>
+          <a:lstStyle/>
+          <a:p>
+            <a:r>
+              <a:rPr lang="en-US" dirty="0" smtClean="0"/>
+              <a:t>Should the availability information be always present as a column or should it be modular: e.g. a bunch of functions to create various kinds of availability columns</a:t>
+            </a:r>
+          </a:p>
+          <a:p>
+            <a:pPr lvl="1"/>
+            <a:r>
+              <a:rPr lang="en-US" dirty="0" smtClean="0"/>
+              <a:t>The second option makes sense</a:t>
+            </a:r>
+          </a:p>
+          <a:p>
+            <a:pPr lvl="2"/>
+            <a:r>
+              <a:rPr lang="en-US" dirty="0" smtClean="0"/>
+              <a:t>More memory efficient</a:t>
+            </a:r>
+          </a:p>
+          <a:p>
+            <a:pPr lvl="2"/>
+            <a:r>
+              <a:rPr lang="en-US" dirty="0" smtClean="0"/>
+              <a:t>More computation efficient</a:t>
+            </a:r>
+          </a:p>
+          <a:p>
+            <a:pPr lvl="2"/>
+            <a:r>
+              <a:rPr lang="en-US" dirty="0" smtClean="0"/>
+              <a:t>More flexible: different function need different kinds of availability: any, all, subset</a:t>
+            </a:r>
+          </a:p>
+          <a:p>
+            <a:pPr lvl="2"/>
+            <a:r>
+              <a:rPr lang="en-US" dirty="0" smtClean="0"/>
+              <a:t>Very fast to compute when needed</a:t>
+            </a:r>
+          </a:p>
+          <a:p>
+            <a:pPr lvl="2"/>
+            <a:r>
+              <a:rPr lang="en-US" dirty="0" smtClean="0"/>
+              <a:t>Limits bug: since the availability does not need to be computed every time there is less chance to</a:t>
+            </a:r>
+            <a:br>
+              <a:rPr lang="en-US" dirty="0" smtClean="0"/>
+            </a:br>
+            <a:r>
+              <a:rPr lang="en-US" dirty="0" smtClean="0"/>
+              <a:t>forget to update it and leave the</a:t>
+            </a:r>
+            <a:br>
+              <a:rPr lang="en-US" dirty="0" smtClean="0"/>
+            </a:br>
+            <a:r>
+              <a:rPr lang="en-US" dirty="0" smtClean="0"/>
+              <a:t>time-</a:t>
+            </a:r>
+            <a:r>
+              <a:rPr lang="en-US" dirty="0" err="1" smtClean="0"/>
+              <a:t>serie</a:t>
+            </a:r>
+            <a:r>
+              <a:rPr lang="en-US" dirty="0" smtClean="0"/>
+              <a:t> in an undefined state</a:t>
+            </a:r>
+            <a:endParaRPr lang="en-US" dirty="0"/>
+          </a:p>
+        </p:txBody>
+      </p:sp>
+      <p:pic>
+        <p:nvPicPr>
+          <p:cNvPr id="8194" name="Picture 2" descr="Image result for time series"/>
+          <p:cNvPicPr>
+            <a:picLocks noChangeAspect="1" noChangeArrowheads="1"/>
+          </p:cNvPicPr>
+          <p:nvPr/>
+        </p:nvPicPr>
+        <p:blipFill>
+          <a:blip r:embed="rId2">
+            <a:extLst>
+              <a:ext uri="{28A0092B-C50C-407E-A947-70E740481C1C}">
+                <a14:useLocalDpi xmlns:a14="http://schemas.microsoft.com/office/drawing/2010/main" val="0"/>
+              </a:ext>
+            </a:extLst>
+          </a:blip>
+          <a:srcRect/>
+          <a:stretch>
+            <a:fillRect/>
+          </a:stretch>
+        </p:blipFill>
+        <p:spPr bwMode="auto">
+          <a:xfrm>
+            <a:off x="5541202" y="4686299"/>
+            <a:ext cx="2983658" cy="1711325"/>
+          </a:xfrm>
+          <a:prstGeom prst="rect">
+            <a:avLst/>
+          </a:prstGeom>
+          <a:noFill/>
+          <a:extLst>
+            <a:ext uri="{909E8E84-426E-40DD-AFC4-6F175D3DCCD1}">
+              <a14:hiddenFill xmlns:a14="http://schemas.microsoft.com/office/drawing/2010/main">
+                <a:solidFill>
+                  <a:srgbClr val="FFFFFF"/>
+                </a:solidFill>
+              </a14:hiddenFill>
+            </a:ext>
+          </a:extLst>
+        </p:spPr>
+      </p:pic>
+    </p:spTree>
+    <p:extLst>
+      <p:ext uri="{BB962C8B-B14F-4D97-AF65-F5344CB8AC3E}">
+        <p14:creationId xmlns:p14="http://schemas.microsoft.com/office/powerpoint/2010/main" val="3438751177"/>
+      </p:ext>
+    </p:extLst>
+  </p:cSld>
+  <p:clrMapOvr>
+    <a:masterClrMapping/>
+  </p:clrMapOvr>
+</p:sld>
+</file>
+
+<file path=ppt/slides/slide69.xml><?xml version="1.0" encoding="utf-8"?>
+<p:sld xmlns:a="http://schemas.openxmlformats.org/drawingml/2006/main" xmlns:r="http://schemas.openxmlformats.org/officeDocument/2006/relationships" xmlns:p="http://schemas.openxmlformats.org/presentationml/2006/main">
+  <p:cSld>
+    <p:spTree>
+      <p:nvGrpSpPr>
+        <p:cNvPr id="1" name=""/>
+        <p:cNvGrpSpPr/>
+        <p:nvPr/>
+      </p:nvGrpSpPr>
+      <p:grpSpPr>
+        <a:xfrm>
+          <a:off x="0" y="0"/>
+          <a:ext cx="0" cy="0"/>
+          <a:chOff x="0" y="0"/>
+          <a:chExt cx="0" cy="0"/>
+        </a:xfrm>
+      </p:grpSpPr>
+      <p:pic>
+        <p:nvPicPr>
+          <p:cNvPr id="5122" name="Picture 2" descr="Image result for time series"/>
+          <p:cNvPicPr>
+            <a:picLocks noChangeAspect="1" noChangeArrowheads="1"/>
+          </p:cNvPicPr>
+          <p:nvPr/>
+        </p:nvPicPr>
+        <p:blipFill>
+          <a:blip r:embed="rId2">
+            <a:extLst>
+              <a:ext uri="{28A0092B-C50C-407E-A947-70E740481C1C}">
+                <a14:useLocalDpi xmlns:a14="http://schemas.microsoft.com/office/drawing/2010/main" val="0"/>
+              </a:ext>
+            </a:extLst>
+          </a:blip>
+          <a:srcRect/>
+          <a:stretch>
+            <a:fillRect/>
+          </a:stretch>
+        </p:blipFill>
+        <p:spPr bwMode="auto">
+          <a:xfrm>
+            <a:off x="6335800" y="14364"/>
+            <a:ext cx="2558819" cy="1467652"/>
+          </a:xfrm>
+          <a:prstGeom prst="rect">
+            <a:avLst/>
+          </a:prstGeom>
+          <a:noFill/>
+          <a:extLst>
+            <a:ext uri="{909E8E84-426E-40DD-AFC4-6F175D3DCCD1}">
+              <a14:hiddenFill xmlns:a14="http://schemas.microsoft.com/office/drawing/2010/main">
+                <a:solidFill>
+                  <a:srgbClr val="FFFFFF"/>
+                </a:solidFill>
+              </a14:hiddenFill>
+            </a:ext>
+          </a:extLst>
+        </p:spPr>
+      </p:pic>
+      <p:sp>
+        <p:nvSpPr>
+          <p:cNvPr id="2" name="Title 1"/>
+          <p:cNvSpPr>
+            <a:spLocks noGrp="1"/>
+          </p:cNvSpPr>
+          <p:nvPr>
+            <p:ph type="title"/>
+          </p:nvPr>
+        </p:nvSpPr>
+        <p:spPr/>
+        <p:txBody>
+          <a:bodyPr/>
+          <a:lstStyle/>
+          <a:p>
+            <a:r>
+              <a:rPr lang="en-US" dirty="0" smtClean="0"/>
+              <a:t>What to test</a:t>
+            </a:r>
+            <a:endParaRPr lang="en-US" dirty="0"/>
+          </a:p>
+        </p:txBody>
+      </p:sp>
+      <p:sp>
+        <p:nvSpPr>
+          <p:cNvPr id="3" name="Content Placeholder 2"/>
+          <p:cNvSpPr>
+            <a:spLocks noGrp="1"/>
+          </p:cNvSpPr>
+          <p:nvPr>
+            <p:ph idx="1"/>
+          </p:nvPr>
+        </p:nvSpPr>
+        <p:spPr/>
+        <p:txBody>
+          <a:bodyPr/>
+          <a:lstStyle/>
+          <a:p>
+            <a:r>
+              <a:rPr lang="en-US" dirty="0" smtClean="0"/>
+              <a:t>The core is the </a:t>
+            </a:r>
+            <a:r>
+              <a:rPr lang="en-US" dirty="0" err="1" smtClean="0"/>
+              <a:t>is.tse</a:t>
+            </a:r>
+            <a:r>
+              <a:rPr lang="en-US" dirty="0" smtClean="0"/>
+              <a:t> function. That</a:t>
+            </a:r>
+            <a:br>
+              <a:rPr lang="en-US" dirty="0" smtClean="0"/>
+            </a:br>
+            <a:r>
+              <a:rPr lang="en-US" dirty="0" smtClean="0"/>
+              <a:t>defines what it means for a </a:t>
+            </a:r>
+            <a:r>
+              <a:rPr lang="en-US" dirty="0" err="1" smtClean="0"/>
+              <a:t>tse</a:t>
+            </a:r>
+            <a:r>
+              <a:rPr lang="en-US" dirty="0" smtClean="0"/>
+              <a:t> to be</a:t>
+            </a:r>
+            <a:br>
+              <a:rPr lang="en-US" dirty="0" smtClean="0"/>
+            </a:br>
+            <a:r>
+              <a:rPr lang="en-US" dirty="0" smtClean="0"/>
+              <a:t>valid. It should always return true whatever the operations</a:t>
+            </a:r>
+          </a:p>
+          <a:p>
+            <a:r>
+              <a:rPr lang="en-US" dirty="0" err="1" smtClean="0"/>
+              <a:t>Is.tse</a:t>
+            </a:r>
+            <a:r>
+              <a:rPr lang="en-US" dirty="0" smtClean="0"/>
+              <a:t> should check for:</a:t>
+            </a:r>
+          </a:p>
+          <a:p>
+            <a:pPr lvl="1"/>
+            <a:r>
+              <a:rPr lang="en-US" dirty="0" smtClean="0"/>
+              <a:t>Consistency of </a:t>
+            </a:r>
+            <a:r>
+              <a:rPr lang="en-US" dirty="0" err="1" smtClean="0"/>
+              <a:t>timezone</a:t>
+            </a:r>
+            <a:endParaRPr lang="en-US" dirty="0" smtClean="0"/>
+          </a:p>
+          <a:p>
+            <a:pPr lvl="1"/>
+            <a:r>
+              <a:rPr lang="en-US" dirty="0" smtClean="0"/>
+              <a:t>Gaps in the time index</a:t>
+            </a:r>
+          </a:p>
+          <a:p>
+            <a:pPr lvl="1"/>
+            <a:r>
+              <a:rPr lang="en-US" dirty="0" smtClean="0"/>
+              <a:t>Validity of the time decorations?</a:t>
+            </a:r>
+          </a:p>
+          <a:p>
+            <a:pPr lvl="1"/>
+            <a:r>
+              <a:rPr lang="en-US" dirty="0" smtClean="0"/>
+              <a:t>Validity of the decorated added time </a:t>
+            </a:r>
+            <a:r>
+              <a:rPr lang="en-US" dirty="0" err="1" smtClean="0"/>
+              <a:t>indexings</a:t>
+            </a:r>
+            <a:endParaRPr lang="en-US" dirty="0" smtClean="0"/>
+          </a:p>
+        </p:txBody>
+      </p:sp>
+    </p:spTree>
+    <p:extLst>
+      <p:ext uri="{BB962C8B-B14F-4D97-AF65-F5344CB8AC3E}">
+        <p14:creationId xmlns:p14="http://schemas.microsoft.com/office/powerpoint/2010/main" val="3842272127"/>
       </p:ext>
     </p:extLst>
   </p:cSld>
@@ -17696,6 +19733,443 @@
       </p:par>
     </p:tnLst>
   </p:timing>
+</p:sld>
+</file>
+
+<file path=ppt/slides/slide70.xml><?xml version="1.0" encoding="utf-8"?>
+<p:sld xmlns:a="http://schemas.openxmlformats.org/drawingml/2006/main" xmlns:r="http://schemas.openxmlformats.org/officeDocument/2006/relationships" xmlns:p="http://schemas.openxmlformats.org/presentationml/2006/main">
+  <p:cSld>
+    <p:spTree>
+      <p:nvGrpSpPr>
+        <p:cNvPr id="1" name=""/>
+        <p:cNvGrpSpPr/>
+        <p:nvPr/>
+      </p:nvGrpSpPr>
+      <p:grpSpPr>
+        <a:xfrm>
+          <a:off x="0" y="0"/>
+          <a:ext cx="0" cy="0"/>
+          <a:chOff x="0" y="0"/>
+          <a:chExt cx="0" cy="0"/>
+        </a:xfrm>
+      </p:grpSpPr>
+      <p:sp>
+        <p:nvSpPr>
+          <p:cNvPr id="2" name="Title 1"/>
+          <p:cNvSpPr>
+            <a:spLocks noGrp="1"/>
+          </p:cNvSpPr>
+          <p:nvPr>
+            <p:ph type="title"/>
+          </p:nvPr>
+        </p:nvSpPr>
+        <p:spPr/>
+        <p:txBody>
+          <a:bodyPr/>
+          <a:lstStyle/>
+          <a:p>
+            <a:r>
+              <a:rPr lang="en-US" dirty="0" smtClean="0"/>
+              <a:t>Code organization</a:t>
+            </a:r>
+            <a:endParaRPr lang="en-US" dirty="0"/>
+          </a:p>
+        </p:txBody>
+      </p:sp>
+      <p:sp>
+        <p:nvSpPr>
+          <p:cNvPr id="5" name="AutoShape 4" descr="Image result for black cathedral"/>
+          <p:cNvSpPr>
+            <a:spLocks noGrp="1" noChangeAspect="1" noChangeArrowheads="1"/>
+          </p:cNvSpPr>
+          <p:nvPr>
+            <p:ph idx="1"/>
+          </p:nvPr>
+        </p:nvSpPr>
+        <p:spPr bwMode="auto">
+          <a:prstGeom prst="rect">
+            <a:avLst/>
+          </a:prstGeom>
+          <a:noFill/>
+          <a:extLst>
+            <a:ext uri="{909E8E84-426E-40DD-AFC4-6F175D3DCCD1}">
+              <a14:hiddenFill xmlns:a14="http://schemas.microsoft.com/office/drawing/2010/main">
+                <a:solidFill>
+                  <a:srgbClr val="FFFFFF"/>
+                </a:solidFill>
+              </a14:hiddenFill>
+            </a:ext>
+          </a:extLst>
+        </p:spPr>
+        <p:txBody>
+          <a:bodyPr vert="horz" wrap="square" lIns="91440" tIns="45720" rIns="91440" bIns="45720" numCol="1" anchor="t" anchorCtr="0" compatLnSpc="1">
+            <a:prstTxWarp prst="textNoShape">
+              <a:avLst/>
+            </a:prstTxWarp>
+          </a:bodyPr>
+          <a:lstStyle/>
+          <a:p>
+            <a:r>
+              <a:rPr lang="en-US" dirty="0" smtClean="0"/>
+              <a:t>Model training is quite long…</a:t>
+            </a:r>
+            <a:br>
+              <a:rPr lang="en-US" dirty="0" smtClean="0"/>
+            </a:br>
+            <a:r>
+              <a:rPr lang="en-US" dirty="0" smtClean="0"/>
+              <a:t>It becomes quite long to iterate</a:t>
+            </a:r>
+          </a:p>
+          <a:p>
+            <a:pPr lvl="1"/>
+            <a:r>
+              <a:rPr lang="en-US" dirty="0" smtClean="0"/>
+              <a:t>Isolate the </a:t>
+            </a:r>
+            <a:r>
+              <a:rPr lang="en-US" b="1" dirty="0" smtClean="0"/>
+              <a:t>long operations</a:t>
+            </a:r>
+            <a:r>
+              <a:rPr lang="en-US" dirty="0" smtClean="0"/>
+              <a:t> in separate</a:t>
+            </a:r>
+            <a:br>
+              <a:rPr lang="en-US" dirty="0" smtClean="0"/>
+            </a:br>
+            <a:r>
+              <a:rPr lang="en-US" dirty="0" smtClean="0"/>
+              <a:t>functions</a:t>
+            </a:r>
+          </a:p>
+          <a:p>
+            <a:pPr lvl="1"/>
+            <a:r>
+              <a:rPr lang="en-US" dirty="0" smtClean="0"/>
+              <a:t>Use a linear model to speed things up </a:t>
+            </a:r>
+            <a:r>
+              <a:rPr lang="en-US" smtClean="0"/>
+              <a:t>for testing</a:t>
+            </a:r>
+            <a:endParaRPr lang="en-US" dirty="0"/>
+          </a:p>
+        </p:txBody>
+      </p:sp>
+      <p:pic>
+        <p:nvPicPr>
+          <p:cNvPr id="12302" name="Picture 14" descr="Image result for cathedral drawing"/>
+          <p:cNvPicPr>
+            <a:picLocks noChangeAspect="1" noChangeArrowheads="1"/>
+          </p:cNvPicPr>
+          <p:nvPr/>
+        </p:nvPicPr>
+        <p:blipFill>
+          <a:blip r:embed="rId2">
+            <a:extLst>
+              <a:ext uri="{28A0092B-C50C-407E-A947-70E740481C1C}">
+                <a14:useLocalDpi xmlns:a14="http://schemas.microsoft.com/office/drawing/2010/main" val="0"/>
+              </a:ext>
+            </a:extLst>
+          </a:blip>
+          <a:srcRect/>
+          <a:stretch>
+            <a:fillRect/>
+          </a:stretch>
+        </p:blipFill>
+        <p:spPr bwMode="auto">
+          <a:xfrm>
+            <a:off x="6701848" y="0"/>
+            <a:ext cx="2124075" cy="2152650"/>
+          </a:xfrm>
+          <a:prstGeom prst="rect">
+            <a:avLst/>
+          </a:prstGeom>
+          <a:noFill/>
+          <a:extLst>
+            <a:ext uri="{909E8E84-426E-40DD-AFC4-6F175D3DCCD1}">
+              <a14:hiddenFill xmlns:a14="http://schemas.microsoft.com/office/drawing/2010/main">
+                <a:solidFill>
+                  <a:srgbClr val="FFFFFF"/>
+                </a:solidFill>
+              </a14:hiddenFill>
+            </a:ext>
+          </a:extLst>
+        </p:spPr>
+      </p:pic>
+    </p:spTree>
+    <p:extLst>
+      <p:ext uri="{BB962C8B-B14F-4D97-AF65-F5344CB8AC3E}">
+        <p14:creationId xmlns:p14="http://schemas.microsoft.com/office/powerpoint/2010/main" val="164843363"/>
+      </p:ext>
+    </p:extLst>
+  </p:cSld>
+  <p:clrMapOvr>
+    <a:masterClrMapping/>
+  </p:clrMapOvr>
+</p:sld>
+</file>
+
+<file path=ppt/slides/slide71.xml><?xml version="1.0" encoding="utf-8"?>
+<p:sld xmlns:a="http://schemas.openxmlformats.org/drawingml/2006/main" xmlns:r="http://schemas.openxmlformats.org/officeDocument/2006/relationships" xmlns:p="http://schemas.openxmlformats.org/presentationml/2006/main">
+  <p:cSld>
+    <p:spTree>
+      <p:nvGrpSpPr>
+        <p:cNvPr id="1" name=""/>
+        <p:cNvGrpSpPr/>
+        <p:nvPr/>
+      </p:nvGrpSpPr>
+      <p:grpSpPr>
+        <a:xfrm>
+          <a:off x="0" y="0"/>
+          <a:ext cx="0" cy="0"/>
+          <a:chOff x="0" y="0"/>
+          <a:chExt cx="0" cy="0"/>
+        </a:xfrm>
+      </p:grpSpPr>
+      <p:sp>
+        <p:nvSpPr>
+          <p:cNvPr id="2" name="Title 1"/>
+          <p:cNvSpPr>
+            <a:spLocks noGrp="1"/>
+          </p:cNvSpPr>
+          <p:nvPr>
+            <p:ph type="title"/>
+          </p:nvPr>
+        </p:nvSpPr>
+        <p:spPr/>
+        <p:txBody>
+          <a:bodyPr/>
+          <a:lstStyle/>
+          <a:p>
+            <a:r>
+              <a:rPr lang="en-US" dirty="0" smtClean="0"/>
+              <a:t>Code organization</a:t>
+            </a:r>
+            <a:endParaRPr lang="en-US" dirty="0"/>
+          </a:p>
+        </p:txBody>
+      </p:sp>
+      <p:sp>
+        <p:nvSpPr>
+          <p:cNvPr id="5" name="AutoShape 4" descr="Image result for black cathedral"/>
+          <p:cNvSpPr>
+            <a:spLocks noGrp="1" noChangeAspect="1" noChangeArrowheads="1"/>
+          </p:cNvSpPr>
+          <p:nvPr>
+            <p:ph idx="1"/>
+          </p:nvPr>
+        </p:nvSpPr>
+        <p:spPr bwMode="auto">
+          <a:prstGeom prst="rect">
+            <a:avLst/>
+          </a:prstGeom>
+          <a:noFill/>
+          <a:extLst>
+            <a:ext uri="{909E8E84-426E-40DD-AFC4-6F175D3DCCD1}">
+              <a14:hiddenFill xmlns:a14="http://schemas.microsoft.com/office/drawing/2010/main">
+                <a:solidFill>
+                  <a:srgbClr val="FFFFFF"/>
+                </a:solidFill>
+              </a14:hiddenFill>
+            </a:ext>
+          </a:extLst>
+        </p:spPr>
+        <p:txBody>
+          <a:bodyPr vert="horz" wrap="square" lIns="91440" tIns="45720" rIns="91440" bIns="45720" numCol="1" anchor="t" anchorCtr="0" compatLnSpc="1">
+            <a:prstTxWarp prst="textNoShape">
+              <a:avLst/>
+            </a:prstTxWarp>
+          </a:bodyPr>
+          <a:lstStyle/>
+          <a:p>
+            <a:endParaRPr lang="en-US" dirty="0"/>
+          </a:p>
+        </p:txBody>
+      </p:sp>
+      <p:pic>
+        <p:nvPicPr>
+          <p:cNvPr id="12302" name="Picture 14" descr="Image result for cathedral drawing"/>
+          <p:cNvPicPr>
+            <a:picLocks noChangeAspect="1" noChangeArrowheads="1"/>
+          </p:cNvPicPr>
+          <p:nvPr/>
+        </p:nvPicPr>
+        <p:blipFill>
+          <a:blip r:embed="rId2">
+            <a:extLst>
+              <a:ext uri="{28A0092B-C50C-407E-A947-70E740481C1C}">
+                <a14:useLocalDpi xmlns:a14="http://schemas.microsoft.com/office/drawing/2010/main" val="0"/>
+              </a:ext>
+            </a:extLst>
+          </a:blip>
+          <a:srcRect/>
+          <a:stretch>
+            <a:fillRect/>
+          </a:stretch>
+        </p:blipFill>
+        <p:spPr bwMode="auto">
+          <a:xfrm>
+            <a:off x="6701848" y="0"/>
+            <a:ext cx="2124075" cy="2152650"/>
+          </a:xfrm>
+          <a:prstGeom prst="rect">
+            <a:avLst/>
+          </a:prstGeom>
+          <a:noFill/>
+          <a:extLst>
+            <a:ext uri="{909E8E84-426E-40DD-AFC4-6F175D3DCCD1}">
+              <a14:hiddenFill xmlns:a14="http://schemas.microsoft.com/office/drawing/2010/main">
+                <a:solidFill>
+                  <a:srgbClr val="FFFFFF"/>
+                </a:solidFill>
+              </a14:hiddenFill>
+            </a:ext>
+          </a:extLst>
+        </p:spPr>
+      </p:pic>
+    </p:spTree>
+    <p:extLst>
+      <p:ext uri="{BB962C8B-B14F-4D97-AF65-F5344CB8AC3E}">
+        <p14:creationId xmlns:p14="http://schemas.microsoft.com/office/powerpoint/2010/main" val="2310135575"/>
+      </p:ext>
+    </p:extLst>
+  </p:cSld>
+  <p:clrMapOvr>
+    <a:masterClrMapping/>
+  </p:clrMapOvr>
+</p:sld>
+</file>
+
+<file path=ppt/slides/slide72.xml><?xml version="1.0" encoding="utf-8"?>
+<p:sld xmlns:a="http://schemas.openxmlformats.org/drawingml/2006/main" xmlns:r="http://schemas.openxmlformats.org/officeDocument/2006/relationships" xmlns:p="http://schemas.openxmlformats.org/presentationml/2006/main">
+  <p:cSld>
+    <p:spTree>
+      <p:nvGrpSpPr>
+        <p:cNvPr id="1" name=""/>
+        <p:cNvGrpSpPr/>
+        <p:nvPr/>
+      </p:nvGrpSpPr>
+      <p:grpSpPr>
+        <a:xfrm>
+          <a:off x="0" y="0"/>
+          <a:ext cx="0" cy="0"/>
+          <a:chOff x="0" y="0"/>
+          <a:chExt cx="0" cy="0"/>
+        </a:xfrm>
+      </p:grpSpPr>
+      <p:sp>
+        <p:nvSpPr>
+          <p:cNvPr id="2" name="Title 1"/>
+          <p:cNvSpPr>
+            <a:spLocks noGrp="1"/>
+          </p:cNvSpPr>
+          <p:nvPr>
+            <p:ph type="title"/>
+          </p:nvPr>
+        </p:nvSpPr>
+        <p:spPr/>
+        <p:txBody>
+          <a:bodyPr/>
+          <a:lstStyle/>
+          <a:p>
+            <a:r>
+              <a:rPr lang="en-US" dirty="0" smtClean="0"/>
+              <a:t>Code organization</a:t>
+            </a:r>
+            <a:endParaRPr lang="en-US" dirty="0"/>
+          </a:p>
+        </p:txBody>
+      </p:sp>
+      <p:sp>
+        <p:nvSpPr>
+          <p:cNvPr id="5" name="AutoShape 4" descr="Image result for black cathedral"/>
+          <p:cNvSpPr>
+            <a:spLocks noGrp="1" noChangeAspect="1" noChangeArrowheads="1"/>
+          </p:cNvSpPr>
+          <p:nvPr>
+            <p:ph idx="1"/>
+          </p:nvPr>
+        </p:nvSpPr>
+        <p:spPr bwMode="auto">
+          <a:prstGeom prst="rect">
+            <a:avLst/>
+          </a:prstGeom>
+          <a:noFill/>
+          <a:extLst>
+            <a:ext uri="{909E8E84-426E-40DD-AFC4-6F175D3DCCD1}">
+              <a14:hiddenFill xmlns:a14="http://schemas.microsoft.com/office/drawing/2010/main">
+                <a:solidFill>
+                  <a:srgbClr val="FFFFFF"/>
+                </a:solidFill>
+              </a14:hiddenFill>
+            </a:ext>
+          </a:extLst>
+        </p:spPr>
+        <p:txBody>
+          <a:bodyPr vert="horz" wrap="square" lIns="91440" tIns="45720" rIns="91440" bIns="45720" numCol="1" anchor="t" anchorCtr="0" compatLnSpc="1">
+            <a:prstTxWarp prst="textNoShape">
+              <a:avLst/>
+            </a:prstTxWarp>
+          </a:bodyPr>
+          <a:lstStyle/>
+          <a:p>
+            <a:endParaRPr lang="en-US" dirty="0"/>
+          </a:p>
+        </p:txBody>
+      </p:sp>
+      <p:pic>
+        <p:nvPicPr>
+          <p:cNvPr id="12302" name="Picture 14" descr="Image result for cathedral drawing"/>
+          <p:cNvPicPr>
+            <a:picLocks noChangeAspect="1" noChangeArrowheads="1"/>
+          </p:cNvPicPr>
+          <p:nvPr/>
+        </p:nvPicPr>
+        <p:blipFill>
+          <a:blip r:embed="rId2">
+            <a:extLst>
+              <a:ext uri="{28A0092B-C50C-407E-A947-70E740481C1C}">
+                <a14:useLocalDpi xmlns:a14="http://schemas.microsoft.com/office/drawing/2010/main" val="0"/>
+              </a:ext>
+            </a:extLst>
+          </a:blip>
+          <a:srcRect/>
+          <a:stretch>
+            <a:fillRect/>
+          </a:stretch>
+        </p:blipFill>
+        <p:spPr bwMode="auto">
+          <a:xfrm>
+            <a:off x="6701848" y="0"/>
+            <a:ext cx="2124075" cy="2152650"/>
+          </a:xfrm>
+          <a:prstGeom prst="rect">
+            <a:avLst/>
+          </a:prstGeom>
+          <a:noFill/>
+          <a:extLst>
+            <a:ext uri="{909E8E84-426E-40DD-AFC4-6F175D3DCCD1}">
+              <a14:hiddenFill xmlns:a14="http://schemas.microsoft.com/office/drawing/2010/main">
+                <a:solidFill>
+                  <a:srgbClr val="FFFFFF"/>
+                </a:solidFill>
+              </a14:hiddenFill>
+            </a:ext>
+          </a:extLst>
+        </p:spPr>
+      </p:pic>
+    </p:spTree>
+    <p:extLst>
+      <p:ext uri="{BB962C8B-B14F-4D97-AF65-F5344CB8AC3E}">
+        <p14:creationId xmlns:p14="http://schemas.microsoft.com/office/powerpoint/2010/main" val="1645111908"/>
+      </p:ext>
+    </p:extLst>
+  </p:cSld>
+  <p:clrMapOvr>
+    <a:masterClrMapping/>
+  </p:clrMapOvr>
 </p:sld>
 </file>
 

</xml_diff>